<commit_message>
Tell user what options are included
</commit_message>
<xml_diff>
--- a/docs/picoframework_full_presentation_combined.pptx
+++ b/docs/picoframework_full_presentation_combined.pptx
@@ -5,7 +5,7 @@
     <p:sldMasterId id="2147483648" r:id="rId1"/>
   </p:sldMasterIdLst>
   <p:notesMasterIdLst>
-    <p:notesMasterId r:id="rId28"/>
+    <p:notesMasterId r:id="rId29"/>
   </p:notesMasterIdLst>
   <p:sldIdLst>
     <p:sldId id="256" r:id="rId2"/>
@@ -16,24 +16,25 @@
     <p:sldId id="293" r:id="rId7"/>
     <p:sldId id="265" r:id="rId8"/>
     <p:sldId id="297" r:id="rId9"/>
-    <p:sldId id="292" r:id="rId10"/>
-    <p:sldId id="266" r:id="rId11"/>
-    <p:sldId id="296" r:id="rId12"/>
-    <p:sldId id="268" r:id="rId13"/>
-    <p:sldId id="291" r:id="rId14"/>
-    <p:sldId id="267" r:id="rId15"/>
-    <p:sldId id="269" r:id="rId16"/>
-    <p:sldId id="294" r:id="rId17"/>
-    <p:sldId id="270" r:id="rId18"/>
-    <p:sldId id="271" r:id="rId19"/>
-    <p:sldId id="278" r:id="rId20"/>
-    <p:sldId id="295" r:id="rId21"/>
-    <p:sldId id="272" r:id="rId22"/>
-    <p:sldId id="273" r:id="rId23"/>
-    <p:sldId id="274" r:id="rId24"/>
-    <p:sldId id="275" r:id="rId25"/>
-    <p:sldId id="287" r:id="rId26"/>
-    <p:sldId id="288" r:id="rId27"/>
+    <p:sldId id="298" r:id="rId10"/>
+    <p:sldId id="292" r:id="rId11"/>
+    <p:sldId id="266" r:id="rId12"/>
+    <p:sldId id="296" r:id="rId13"/>
+    <p:sldId id="268" r:id="rId14"/>
+    <p:sldId id="291" r:id="rId15"/>
+    <p:sldId id="267" r:id="rId16"/>
+    <p:sldId id="269" r:id="rId17"/>
+    <p:sldId id="294" r:id="rId18"/>
+    <p:sldId id="270" r:id="rId19"/>
+    <p:sldId id="271" r:id="rId20"/>
+    <p:sldId id="278" r:id="rId21"/>
+    <p:sldId id="295" r:id="rId22"/>
+    <p:sldId id="272" r:id="rId23"/>
+    <p:sldId id="273" r:id="rId24"/>
+    <p:sldId id="274" r:id="rId25"/>
+    <p:sldId id="275" r:id="rId26"/>
+    <p:sldId id="287" r:id="rId27"/>
+    <p:sldId id="288" r:id="rId28"/>
   </p:sldIdLst>
   <p:sldSz cx="9144000" cy="6858000" type="screen4x3"/>
   <p:notesSz cx="6858000" cy="9144000"/>
@@ -34610,6 +34611,611 @@
       </p:grpSpPr>
       <p:sp useBgFill="1">
         <p:nvSpPr>
+          <p:cNvPr id="8" name="Rectangle 7">
+            <a:extLst>
+              <a:ext uri="{FF2B5EF4-FFF2-40B4-BE49-F238E27FC236}">
+                <a16:creationId xmlns:a16="http://schemas.microsoft.com/office/drawing/2014/main" id="{1B15ED52-F352-441B-82BF-E0EA34836D08}"/>
+              </a:ext>
+              <a:ext uri="{C183D7F6-B498-43B3-948B-1728B52AA6E4}">
+                <adec:decorative xmlns:adec="http://schemas.microsoft.com/office/drawing/2017/decorative" val="1"/>
+              </a:ext>
+            </a:extLst>
+          </p:cNvPr>
+          <p:cNvSpPr>
+            <a:spLocks noGrp="1" noRot="1" noChangeAspect="1" noMove="1" noResize="1" noEditPoints="1" noAdjustHandles="1" noChangeArrowheads="1" noChangeShapeType="1" noTextEdit="1"/>
+          </p:cNvSpPr>
+          <p:nvPr>
+            <p:extLst>
+              <p:ext uri="{386F3935-93C4-4BCD-93E2-E3B085C9AB24}">
+                <p16:designElem xmlns:p16="http://schemas.microsoft.com/office/powerpoint/2015/main" val="1"/>
+              </p:ext>
+            </p:extLst>
+          </p:nvPr>
+        </p:nvSpPr>
+        <p:spPr>
+          <a:xfrm>
+            <a:off x="0" y="0"/>
+            <a:ext cx="9144000" cy="6858000"/>
+          </a:xfrm>
+          <a:prstGeom prst="rect">
+            <a:avLst/>
+          </a:prstGeom>
+          <a:ln w="12700" cap="flat" cmpd="sng" algn="ctr">
+            <a:noFill/>
+            <a:prstDash val="solid"/>
+            <a:miter lim="800000"/>
+          </a:ln>
+          <a:effectLst/>
+          <a:extLst>
+            <a:ext uri="{91240B29-F687-4F45-9708-019B960494DF}">
+              <a14:hiddenLine xmlns:a14="http://schemas.microsoft.com/office/drawing/2010/main" w="12700" cap="flat" cmpd="sng" algn="ctr">
+                <a:solidFill>
+                  <a:schemeClr val="accent1">
+                    <a:shade val="50000"/>
+                  </a:schemeClr>
+                </a:solidFill>
+                <a:prstDash val="solid"/>
+                <a:miter lim="800000"/>
+              </a14:hiddenLine>
+            </a:ext>
+          </a:extLst>
+        </p:spPr>
+        <p:style>
+          <a:lnRef idx="2">
+            <a:schemeClr val="accent1">
+              <a:shade val="50000"/>
+            </a:schemeClr>
+          </a:lnRef>
+          <a:fillRef idx="1">
+            <a:schemeClr val="accent1"/>
+          </a:fillRef>
+          <a:effectRef idx="0">
+            <a:schemeClr val="accent1"/>
+          </a:effectRef>
+          <a:fontRef idx="minor">
+            <a:schemeClr val="lt1"/>
+          </a:fontRef>
+        </p:style>
+        <p:txBody>
+          <a:bodyPr rtlCol="0" anchor="ctr"/>
+          <a:lstStyle/>
+          <a:p>
+            <a:pPr algn="ctr"/>
+            <a:endParaRPr lang="en-US"/>
+          </a:p>
+        </p:txBody>
+      </p:sp>
+      <p:sp>
+        <p:nvSpPr>
+          <p:cNvPr id="10" name="Rectangle 9">
+            <a:extLst>
+              <a:ext uri="{FF2B5EF4-FFF2-40B4-BE49-F238E27FC236}">
+                <a16:creationId xmlns:a16="http://schemas.microsoft.com/office/drawing/2014/main" id="{3B2E3793-BFE6-45A2-9B7B-E18844431C99}"/>
+              </a:ext>
+              <a:ext uri="{C183D7F6-B498-43B3-948B-1728B52AA6E4}">
+                <adec:decorative xmlns:adec="http://schemas.microsoft.com/office/drawing/2017/decorative" val="1"/>
+              </a:ext>
+            </a:extLst>
+          </p:cNvPr>
+          <p:cNvSpPr>
+            <a:spLocks noGrp="1" noRot="1" noChangeAspect="1" noMove="1" noResize="1" noEditPoints="1" noAdjustHandles="1" noChangeArrowheads="1" noChangeShapeType="1" noTextEdit="1"/>
+          </p:cNvSpPr>
+          <p:nvPr>
+            <p:extLst>
+              <p:ext uri="{386F3935-93C4-4BCD-93E2-E3B085C9AB24}">
+                <p16:designElem xmlns:p16="http://schemas.microsoft.com/office/powerpoint/2015/main" val="1"/>
+              </p:ext>
+            </p:extLst>
+          </p:nvPr>
+        </p:nvSpPr>
+        <p:spPr>
+          <a:xfrm flipH="1">
+            <a:off x="0" y="-1"/>
+            <a:ext cx="9143997" cy="1590742"/>
+          </a:xfrm>
+          <a:prstGeom prst="rect">
+            <a:avLst/>
+          </a:prstGeom>
+          <a:gradFill>
+            <a:gsLst>
+              <a:gs pos="0">
+                <a:srgbClr val="000000"/>
+              </a:gs>
+              <a:gs pos="100000">
+                <a:schemeClr val="accent1">
+                  <a:lumMod val="75000"/>
+                </a:schemeClr>
+              </a:gs>
+            </a:gsLst>
+            <a:lin ang="8400000" scaled="0"/>
+          </a:gradFill>
+          <a:ln>
+            <a:noFill/>
+          </a:ln>
+        </p:spPr>
+        <p:style>
+          <a:lnRef idx="2">
+            <a:schemeClr val="accent1">
+              <a:shade val="50000"/>
+            </a:schemeClr>
+          </a:lnRef>
+          <a:fillRef idx="1">
+            <a:schemeClr val="accent1"/>
+          </a:fillRef>
+          <a:effectRef idx="0">
+            <a:schemeClr val="accent1"/>
+          </a:effectRef>
+          <a:fontRef idx="minor">
+            <a:schemeClr val="lt1"/>
+          </a:fontRef>
+        </p:style>
+        <p:txBody>
+          <a:bodyPr rtlCol="0" anchor="ctr"/>
+          <a:lstStyle/>
+          <a:p>
+            <a:pPr algn="ctr"/>
+            <a:endParaRPr lang="en-US"/>
+          </a:p>
+        </p:txBody>
+      </p:sp>
+      <p:sp>
+        <p:nvSpPr>
+          <p:cNvPr id="12" name="Rectangle 11">
+            <a:extLst>
+              <a:ext uri="{FF2B5EF4-FFF2-40B4-BE49-F238E27FC236}">
+                <a16:creationId xmlns:a16="http://schemas.microsoft.com/office/drawing/2014/main" id="{BC4C4868-CB8F-4AF9-9CDB-8108F2C19B67}"/>
+              </a:ext>
+              <a:ext uri="{C183D7F6-B498-43B3-948B-1728B52AA6E4}">
+                <adec:decorative xmlns:adec="http://schemas.microsoft.com/office/drawing/2017/decorative" val="1"/>
+              </a:ext>
+            </a:extLst>
+          </p:cNvPr>
+          <p:cNvSpPr>
+            <a:spLocks noGrp="1" noRot="1" noChangeAspect="1" noMove="1" noResize="1" noEditPoints="1" noAdjustHandles="1" noChangeArrowheads="1" noChangeShapeType="1" noTextEdit="1"/>
+          </p:cNvSpPr>
+          <p:nvPr>
+            <p:extLst>
+              <p:ext uri="{386F3935-93C4-4BCD-93E2-E3B085C9AB24}">
+                <p16:designElem xmlns:p16="http://schemas.microsoft.com/office/powerpoint/2015/main" val="1"/>
+              </p:ext>
+            </p:extLst>
+          </p:nvPr>
+        </p:nvSpPr>
+        <p:spPr>
+          <a:xfrm rot="10800000" flipH="1">
+            <a:off x="-2" y="0"/>
+            <a:ext cx="6086479" cy="1590742"/>
+          </a:xfrm>
+          <a:prstGeom prst="rect">
+            <a:avLst/>
+          </a:prstGeom>
+          <a:gradFill>
+            <a:gsLst>
+              <a:gs pos="20000">
+                <a:schemeClr val="accent1">
+                  <a:alpha val="0"/>
+                </a:schemeClr>
+              </a:gs>
+              <a:gs pos="100000">
+                <a:schemeClr val="accent1">
+                  <a:lumMod val="50000"/>
+                  <a:alpha val="55000"/>
+                </a:schemeClr>
+              </a:gs>
+            </a:gsLst>
+            <a:lin ang="13800000" scaled="0"/>
+          </a:gradFill>
+          <a:ln>
+            <a:noFill/>
+          </a:ln>
+        </p:spPr>
+        <p:style>
+          <a:lnRef idx="2">
+            <a:schemeClr val="accent1">
+              <a:shade val="50000"/>
+            </a:schemeClr>
+          </a:lnRef>
+          <a:fillRef idx="1">
+            <a:schemeClr val="accent1"/>
+          </a:fillRef>
+          <a:effectRef idx="0">
+            <a:schemeClr val="accent1"/>
+          </a:effectRef>
+          <a:fontRef idx="minor">
+            <a:schemeClr val="lt1"/>
+          </a:fontRef>
+        </p:style>
+        <p:txBody>
+          <a:bodyPr rtlCol="0" anchor="ctr"/>
+          <a:lstStyle/>
+          <a:p>
+            <a:pPr algn="ctr"/>
+            <a:endParaRPr lang="en-US"/>
+          </a:p>
+        </p:txBody>
+      </p:sp>
+      <p:sp>
+        <p:nvSpPr>
+          <p:cNvPr id="14" name="Rectangle 13">
+            <a:extLst>
+              <a:ext uri="{FF2B5EF4-FFF2-40B4-BE49-F238E27FC236}">
+                <a16:creationId xmlns:a16="http://schemas.microsoft.com/office/drawing/2014/main" id="{375E0459-6403-40CD-989D-56A4407CA12E}"/>
+              </a:ext>
+              <a:ext uri="{C183D7F6-B498-43B3-948B-1728B52AA6E4}">
+                <adec:decorative xmlns:adec="http://schemas.microsoft.com/office/drawing/2017/decorative" val="1"/>
+              </a:ext>
+            </a:extLst>
+          </p:cNvPr>
+          <p:cNvSpPr>
+            <a:spLocks noGrp="1" noRot="1" noChangeAspect="1" noMove="1" noResize="1" noEditPoints="1" noAdjustHandles="1" noChangeArrowheads="1" noChangeShapeType="1" noTextEdit="1"/>
+          </p:cNvSpPr>
+          <p:nvPr>
+            <p:extLst>
+              <p:ext uri="{386F3935-93C4-4BCD-93E2-E3B085C9AB24}">
+                <p16:designElem xmlns:p16="http://schemas.microsoft.com/office/powerpoint/2015/main" val="1"/>
+              </p:ext>
+            </p:extLst>
+          </p:nvPr>
+        </p:nvSpPr>
+        <p:spPr>
+          <a:xfrm flipH="1">
+            <a:off x="6086474" y="-1"/>
+            <a:ext cx="3057523" cy="1590742"/>
+          </a:xfrm>
+          <a:prstGeom prst="rect">
+            <a:avLst/>
+          </a:prstGeom>
+          <a:gradFill>
+            <a:gsLst>
+              <a:gs pos="0">
+                <a:schemeClr val="accent1">
+                  <a:alpha val="66000"/>
+                </a:schemeClr>
+              </a:gs>
+              <a:gs pos="100000">
+                <a:srgbClr val="000000">
+                  <a:alpha val="30000"/>
+                </a:srgbClr>
+              </a:gs>
+            </a:gsLst>
+            <a:lin ang="13200000" scaled="0"/>
+          </a:gradFill>
+          <a:ln>
+            <a:noFill/>
+          </a:ln>
+        </p:spPr>
+        <p:style>
+          <a:lnRef idx="2">
+            <a:schemeClr val="accent1">
+              <a:shade val="50000"/>
+            </a:schemeClr>
+          </a:lnRef>
+          <a:fillRef idx="1">
+            <a:schemeClr val="accent1"/>
+          </a:fillRef>
+          <a:effectRef idx="0">
+            <a:schemeClr val="accent1"/>
+          </a:effectRef>
+          <a:fontRef idx="minor">
+            <a:schemeClr val="lt1"/>
+          </a:fontRef>
+        </p:style>
+        <p:txBody>
+          <a:bodyPr rtlCol="0" anchor="ctr"/>
+          <a:lstStyle/>
+          <a:p>
+            <a:pPr algn="ctr"/>
+            <a:endParaRPr lang="en-US"/>
+          </a:p>
+        </p:txBody>
+      </p:sp>
+      <p:sp>
+        <p:nvSpPr>
+          <p:cNvPr id="16" name="Rectangle 15">
+            <a:extLst>
+              <a:ext uri="{FF2B5EF4-FFF2-40B4-BE49-F238E27FC236}">
+                <a16:creationId xmlns:a16="http://schemas.microsoft.com/office/drawing/2014/main" id="{53E5B1A8-3AC9-4BD1-9BBC-78CA94F2D1BA}"/>
+              </a:ext>
+              <a:ext uri="{C183D7F6-B498-43B3-948B-1728B52AA6E4}">
+                <adec:decorative xmlns:adec="http://schemas.microsoft.com/office/drawing/2017/decorative" val="1"/>
+              </a:ext>
+            </a:extLst>
+          </p:cNvPr>
+          <p:cNvSpPr>
+            <a:spLocks noGrp="1" noRot="1" noChangeAspect="1" noMove="1" noResize="1" noEditPoints="1" noAdjustHandles="1" noChangeArrowheads="1" noChangeShapeType="1" noTextEdit="1"/>
+          </p:cNvSpPr>
+          <p:nvPr>
+            <p:extLst>
+              <p:ext uri="{386F3935-93C4-4BCD-93E2-E3B085C9AB24}">
+                <p16:designElem xmlns:p16="http://schemas.microsoft.com/office/powerpoint/2015/main" val="1"/>
+              </p:ext>
+            </p:extLst>
+          </p:nvPr>
+        </p:nvSpPr>
+        <p:spPr>
+          <a:xfrm>
+            <a:off x="344512" y="-1"/>
+            <a:ext cx="8799485" cy="1597433"/>
+          </a:xfrm>
+          <a:prstGeom prst="rect">
+            <a:avLst/>
+          </a:prstGeom>
+          <a:gradFill>
+            <a:gsLst>
+              <a:gs pos="50000">
+                <a:srgbClr val="000000">
+                  <a:alpha val="0"/>
+                </a:srgbClr>
+              </a:gs>
+              <a:gs pos="99000">
+                <a:schemeClr val="accent1">
+                  <a:lumMod val="50000"/>
+                  <a:alpha val="52000"/>
+                </a:schemeClr>
+              </a:gs>
+            </a:gsLst>
+            <a:lin ang="16800000" scaled="0"/>
+          </a:gradFill>
+          <a:ln>
+            <a:noFill/>
+          </a:ln>
+        </p:spPr>
+        <p:style>
+          <a:lnRef idx="2">
+            <a:schemeClr val="accent1">
+              <a:shade val="50000"/>
+            </a:schemeClr>
+          </a:lnRef>
+          <a:fillRef idx="1">
+            <a:schemeClr val="accent1"/>
+          </a:fillRef>
+          <a:effectRef idx="0">
+            <a:schemeClr val="accent1"/>
+          </a:effectRef>
+          <a:fontRef idx="minor">
+            <a:schemeClr val="lt1"/>
+          </a:fontRef>
+        </p:style>
+        <p:txBody>
+          <a:bodyPr rtlCol="0" anchor="ctr"/>
+          <a:lstStyle/>
+          <a:p>
+            <a:pPr algn="ctr"/>
+            <a:endParaRPr lang="en-US"/>
+          </a:p>
+        </p:txBody>
+      </p:sp>
+      <p:sp>
+        <p:nvSpPr>
+          <p:cNvPr id="2" name="Title 1"/>
+          <p:cNvSpPr>
+            <a:spLocks noGrp="1"/>
+          </p:cNvSpPr>
+          <p:nvPr>
+            <p:ph type="title"/>
+          </p:nvPr>
+        </p:nvSpPr>
+        <p:spPr>
+          <a:xfrm>
+            <a:off x="1028699" y="294538"/>
+            <a:ext cx="7421963" cy="1033669"/>
+          </a:xfrm>
+        </p:spPr>
+        <p:txBody>
+          <a:bodyPr>
+            <a:normAutofit/>
+          </a:bodyPr>
+          <a:lstStyle/>
+          <a:p>
+            <a:r>
+              <a:rPr lang="en-US" sz="3500">
+                <a:solidFill>
+                  <a:srgbClr val="FFFFFF"/>
+                </a:solidFill>
+              </a:rPr>
+              <a:t>Routing System (Express.js-style)</a:t>
+            </a:r>
+          </a:p>
+        </p:txBody>
+      </p:sp>
+      <p:sp>
+        <p:nvSpPr>
+          <p:cNvPr id="3" name="Content Placeholder 2"/>
+          <p:cNvSpPr>
+            <a:spLocks noGrp="1"/>
+          </p:cNvSpPr>
+          <p:nvPr>
+            <p:ph idx="1"/>
+          </p:nvPr>
+        </p:nvSpPr>
+        <p:spPr>
+          <a:xfrm>
+            <a:off x="1028699" y="2318197"/>
+            <a:ext cx="7293023" cy="3683358"/>
+          </a:xfrm>
+        </p:spPr>
+        <p:txBody>
+          <a:bodyPr anchor="ctr">
+            <a:normAutofit/>
+          </a:bodyPr>
+          <a:lstStyle/>
+          <a:p>
+            <a:pPr>
+              <a:lnSpc>
+                <a:spcPct val="90000"/>
+              </a:lnSpc>
+            </a:pPr>
+            <a:r>
+              <a:rPr lang="en-US" sz="1700"/>
+              <a:t>Add routes via router.addRoute(method, path, handler)</a:t>
+            </a:r>
+          </a:p>
+          <a:p>
+            <a:pPr>
+              <a:lnSpc>
+                <a:spcPct val="90000"/>
+              </a:lnSpc>
+            </a:pPr>
+            <a:r>
+              <a:rPr lang="en-US" sz="1700"/>
+              <a:t>REST-friendly: GET, POST, PUT, DELETE</a:t>
+            </a:r>
+          </a:p>
+          <a:p>
+            <a:pPr>
+              <a:lnSpc>
+                <a:spcPct val="90000"/>
+              </a:lnSpc>
+            </a:pPr>
+            <a:r>
+              <a:rPr lang="en-US" sz="1700"/>
+              <a:t>Lambdas or method pointers as handlers</a:t>
+            </a:r>
+          </a:p>
+          <a:p>
+            <a:pPr>
+              <a:lnSpc>
+                <a:spcPct val="90000"/>
+              </a:lnSpc>
+            </a:pPr>
+            <a:r>
+              <a:rPr lang="en-US" sz="1700"/>
+              <a:t>Per-route and global middleware</a:t>
+            </a:r>
+          </a:p>
+          <a:p>
+            <a:pPr>
+              <a:lnSpc>
+                <a:spcPct val="90000"/>
+              </a:lnSpc>
+            </a:pPr>
+            <a:r>
+              <a:rPr lang="en-US" sz="1700"/>
+              <a:t>Path parsing and matching with variables</a:t>
+            </a:r>
+          </a:p>
+          <a:p>
+            <a:pPr>
+              <a:lnSpc>
+                <a:spcPct val="90000"/>
+              </a:lnSpc>
+            </a:pPr>
+            <a:r>
+              <a:rPr lang="en-US" sz="1700"/>
+              <a:t>Built-in /auth route handler for JWT token test (can override)</a:t>
+            </a:r>
+          </a:p>
+          <a:p>
+            <a:pPr>
+              <a:lnSpc>
+                <a:spcPct val="90000"/>
+              </a:lnSpc>
+            </a:pPr>
+            <a:r>
+              <a:rPr lang="en-US" sz="1700"/>
+              <a:t>Route debug printing (adding, handling routes)</a:t>
+            </a:r>
+          </a:p>
+          <a:p>
+            <a:pPr>
+              <a:lnSpc>
+                <a:spcPct val="90000"/>
+              </a:lnSpc>
+            </a:pPr>
+            <a:endParaRPr lang="en-US" sz="1700"/>
+          </a:p>
+          <a:p>
+            <a:pPr marL="0" indent="0">
+              <a:lnSpc>
+                <a:spcPct val="90000"/>
+              </a:lnSpc>
+              <a:buNone/>
+            </a:pPr>
+            <a:r>
+              <a:rPr lang="en-US" sz="1700">
+                <a:latin typeface="Consolas" panose="020B0609020204030204" pitchFamily="49" charset="0"/>
+                <a:cs typeface="Consolas" panose="020B0609020204030204" pitchFamily="49" charset="0"/>
+              </a:rPr>
+              <a:t>router.addRoute("GET", "/info", [](Request &amp;req, Response &amp;res) { res.sendText("System Info Page"); });</a:t>
+            </a:r>
+          </a:p>
+          <a:p>
+            <a:pPr marL="0" indent="0">
+              <a:lnSpc>
+                <a:spcPct val="90000"/>
+              </a:lnSpc>
+              <a:buNone/>
+            </a:pPr>
+            <a:endParaRPr lang="en-US" sz="1700">
+              <a:latin typeface="Consolas" panose="020B0609020204030204" pitchFamily="49" charset="0"/>
+              <a:cs typeface="Consolas" panose="020B0609020204030204" pitchFamily="49" charset="0"/>
+            </a:endParaRPr>
+          </a:p>
+          <a:p>
+            <a:pPr marL="0" indent="0">
+              <a:lnSpc>
+                <a:spcPct val="90000"/>
+              </a:lnSpc>
+              <a:buNone/>
+            </a:pPr>
+            <a:r>
+              <a:rPr lang="en-US" sz="1700">
+                <a:latin typeface="Consolas" panose="020B0609020204030204" pitchFamily="49" charset="0"/>
+                <a:cs typeface="Consolas" panose="020B0609020204030204" pitchFamily="49" charset="0"/>
+              </a:rPr>
+              <a:t>router.addRoute("POST", "/config", configHandler, {authMiddleware});</a:t>
+            </a:r>
+          </a:p>
+          <a:p>
+            <a:pPr>
+              <a:lnSpc>
+                <a:spcPct val="90000"/>
+              </a:lnSpc>
+            </a:pPr>
+            <a:endParaRPr lang="en-US" sz="1700"/>
+          </a:p>
+        </p:txBody>
+      </p:sp>
+    </p:spTree>
+    <p:extLst>
+      <p:ext uri="{BB962C8B-B14F-4D97-AF65-F5344CB8AC3E}">
+        <p14:creationId xmlns:p14="http://schemas.microsoft.com/office/powerpoint/2010/main" val="4051212457"/>
+      </p:ext>
+    </p:extLst>
+  </p:cSld>
+  <p:clrMapOvr>
+    <a:masterClrMapping/>
+  </p:clrMapOvr>
+</p:sld>
+</file>
+
+<file path=ppt/slides/slide11.xml><?xml version="1.0" encoding="utf-8"?>
+<p:sld xmlns:a="http://schemas.openxmlformats.org/drawingml/2006/main" xmlns:r="http://schemas.openxmlformats.org/officeDocument/2006/relationships" xmlns:p="http://schemas.openxmlformats.org/presentationml/2006/main">
+  <p:cSld>
+    <p:bg>
+      <p:bgPr>
+        <a:solidFill>
+          <a:schemeClr val="bg1"/>
+        </a:solidFill>
+        <a:effectLst/>
+      </p:bgPr>
+    </p:bg>
+    <p:spTree>
+      <p:nvGrpSpPr>
+        <p:cNvPr id="1" name=""/>
+        <p:cNvGrpSpPr/>
+        <p:nvPr/>
+      </p:nvGrpSpPr>
+      <p:grpSpPr>
+        <a:xfrm>
+          <a:off x="0" y="0"/>
+          <a:ext cx="0" cy="0"/>
+          <a:chOff x="0" y="0"/>
+          <a:chExt cx="0" cy="0"/>
+        </a:xfrm>
+      </p:grpSpPr>
+      <p:sp useBgFill="1">
+        <p:nvSpPr>
           <p:cNvPr id="13" name="Rectangle 12">
             <a:extLst>
               <a:ext uri="{FF2B5EF4-FFF2-40B4-BE49-F238E27FC236}">
@@ -35675,7 +36281,7 @@
 </p:sld>
 </file>
 
-<file path=ppt/slides/slide11.xml><?xml version="1.0" encoding="utf-8"?>
+<file path=ppt/slides/slide12.xml><?xml version="1.0" encoding="utf-8"?>
 <p:sld xmlns:a="http://schemas.openxmlformats.org/drawingml/2006/main" xmlns:r="http://schemas.openxmlformats.org/officeDocument/2006/relationships" xmlns:p="http://schemas.openxmlformats.org/presentationml/2006/main">
   <p:cSld>
     <p:bg>
@@ -36418,7 +37024,7 @@
 </p:sld>
 </file>
 
-<file path=ppt/slides/slide12.xml><?xml version="1.0" encoding="utf-8"?>
+<file path=ppt/slides/slide13.xml><?xml version="1.0" encoding="utf-8"?>
 <p:sld xmlns:a="http://schemas.openxmlformats.org/drawingml/2006/main" xmlns:r="http://schemas.openxmlformats.org/officeDocument/2006/relationships" xmlns:p="http://schemas.openxmlformats.org/presentationml/2006/main">
   <p:cSld>
     <p:spTree>
@@ -36491,7 +37097,7 @@
 </p:sld>
 </file>
 
-<file path=ppt/slides/slide13.xml><?xml version="1.0" encoding="utf-8"?>
+<file path=ppt/slides/slide14.xml><?xml version="1.0" encoding="utf-8"?>
 <p:sld xmlns:a="http://schemas.openxmlformats.org/drawingml/2006/main" xmlns:r="http://schemas.openxmlformats.org/officeDocument/2006/relationships" xmlns:p="http://schemas.openxmlformats.org/presentationml/2006/main">
   <p:cSld>
     <p:bg>
@@ -37059,7 +37665,7 @@
 </p:sld>
 </file>
 
-<file path=ppt/slides/slide14.xml><?xml version="1.0" encoding="utf-8"?>
+<file path=ppt/slides/slide15.xml><?xml version="1.0" encoding="utf-8"?>
 <p:sld xmlns:a="http://schemas.openxmlformats.org/drawingml/2006/main" xmlns:r="http://schemas.openxmlformats.org/officeDocument/2006/relationships" xmlns:p="http://schemas.openxmlformats.org/presentationml/2006/main">
   <p:cSld>
     <p:bg>
@@ -37489,7 +38095,7 @@
 </p:sld>
 </file>
 
-<file path=ppt/slides/slide15.xml><?xml version="1.0" encoding="utf-8"?>
+<file path=ppt/slides/slide16.xml><?xml version="1.0" encoding="utf-8"?>
 <p:sld xmlns:a="http://schemas.openxmlformats.org/drawingml/2006/main" xmlns:r="http://schemas.openxmlformats.org/officeDocument/2006/relationships" xmlns:p="http://schemas.openxmlformats.org/presentationml/2006/main">
   <p:cSld>
     <p:bg>
@@ -38035,7 +38641,7 @@
 </p:sld>
 </file>
 
-<file path=ppt/slides/slide16.xml><?xml version="1.0" encoding="utf-8"?>
+<file path=ppt/slides/slide17.xml><?xml version="1.0" encoding="utf-8"?>
 <p:sld xmlns:a="http://schemas.openxmlformats.org/drawingml/2006/main" xmlns:r="http://schemas.openxmlformats.org/officeDocument/2006/relationships" xmlns:p="http://schemas.openxmlformats.org/presentationml/2006/main">
   <p:cSld>
     <p:bg>
@@ -38833,7 +39439,7 @@
 </p:sld>
 </file>
 
-<file path=ppt/slides/slide17.xml><?xml version="1.0" encoding="utf-8"?>
+<file path=ppt/slides/slide18.xml><?xml version="1.0" encoding="utf-8"?>
 <p:sld xmlns:a="http://schemas.openxmlformats.org/drawingml/2006/main" xmlns:r="http://schemas.openxmlformats.org/officeDocument/2006/relationships" xmlns:p="http://schemas.openxmlformats.org/presentationml/2006/main">
   <p:cSld>
     <p:bg>
@@ -39232,7 +39838,7 @@
 </p:sld>
 </file>
 
-<file path=ppt/slides/slide18.xml><?xml version="1.0" encoding="utf-8"?>
+<file path=ppt/slides/slide19.xml><?xml version="1.0" encoding="utf-8"?>
 <p:sld xmlns:a="http://schemas.openxmlformats.org/drawingml/2006/main" xmlns:r="http://schemas.openxmlformats.org/officeDocument/2006/relationships" xmlns:p="http://schemas.openxmlformats.org/presentationml/2006/main">
   <p:cSld>
     <p:bg>
@@ -39631,7 +40237,494 @@
 </p:sld>
 </file>
 
-<file path=ppt/slides/slide19.xml><?xml version="1.0" encoding="utf-8"?>
+<file path=ppt/slides/slide2.xml><?xml version="1.0" encoding="utf-8"?>
+<p:sld xmlns:a="http://schemas.openxmlformats.org/drawingml/2006/main" xmlns:r="http://schemas.openxmlformats.org/officeDocument/2006/relationships" xmlns:p="http://schemas.openxmlformats.org/presentationml/2006/main">
+  <p:cSld>
+    <p:bg>
+      <p:bgPr>
+        <a:solidFill>
+          <a:schemeClr val="bg1"/>
+        </a:solidFill>
+        <a:effectLst/>
+      </p:bgPr>
+    </p:bg>
+    <p:spTree>
+      <p:nvGrpSpPr>
+        <p:cNvPr id="1" name=""/>
+        <p:cNvGrpSpPr/>
+        <p:nvPr/>
+      </p:nvGrpSpPr>
+      <p:grpSpPr>
+        <a:xfrm>
+          <a:off x="0" y="0"/>
+          <a:ext cx="0" cy="0"/>
+          <a:chOff x="0" y="0"/>
+          <a:chExt cx="0" cy="0"/>
+        </a:xfrm>
+      </p:grpSpPr>
+      <p:sp useBgFill="1">
+        <p:nvSpPr>
+          <p:cNvPr id="39" name="Rectangle 38">
+            <a:extLst>
+              <a:ext uri="{FF2B5EF4-FFF2-40B4-BE49-F238E27FC236}">
+                <a16:creationId xmlns:a16="http://schemas.microsoft.com/office/drawing/2014/main" id="{56E9B3E6-E277-4D68-BA48-9CB43FFBD6E2}"/>
+              </a:ext>
+              <a:ext uri="{C183D7F6-B498-43B3-948B-1728B52AA6E4}">
+                <adec:decorative xmlns:adec="http://schemas.microsoft.com/office/drawing/2017/decorative" val="1"/>
+              </a:ext>
+            </a:extLst>
+          </p:cNvPr>
+          <p:cNvSpPr>
+            <a:spLocks noGrp="1" noRot="1" noChangeAspect="1" noMove="1" noResize="1" noEditPoints="1" noAdjustHandles="1" noChangeArrowheads="1" noChangeShapeType="1" noTextEdit="1"/>
+          </p:cNvSpPr>
+          <p:nvPr>
+            <p:extLst>
+              <p:ext uri="{386F3935-93C4-4BCD-93E2-E3B085C9AB24}">
+                <p16:designElem xmlns:p16="http://schemas.microsoft.com/office/powerpoint/2015/main" val="1"/>
+              </p:ext>
+            </p:extLst>
+          </p:nvPr>
+        </p:nvSpPr>
+        <p:spPr>
+          <a:xfrm>
+            <a:off x="0" y="0"/>
+            <a:ext cx="9143999" cy="6857365"/>
+          </a:xfrm>
+          <a:prstGeom prst="rect">
+            <a:avLst/>
+          </a:prstGeom>
+          <a:ln>
+            <a:noFill/>
+          </a:ln>
+        </p:spPr>
+        <p:style>
+          <a:lnRef idx="2">
+            <a:schemeClr val="accent1">
+              <a:shade val="50000"/>
+            </a:schemeClr>
+          </a:lnRef>
+          <a:fillRef idx="1">
+            <a:schemeClr val="accent1"/>
+          </a:fillRef>
+          <a:effectRef idx="0">
+            <a:schemeClr val="accent1"/>
+          </a:effectRef>
+          <a:fontRef idx="minor">
+            <a:schemeClr val="lt1"/>
+          </a:fontRef>
+        </p:style>
+        <p:txBody>
+          <a:bodyPr rtlCol="0" anchor="ctr"/>
+          <a:lstStyle/>
+          <a:p>
+            <a:pPr algn="ctr"/>
+            <a:endParaRPr lang="en-US"/>
+          </a:p>
+        </p:txBody>
+      </p:sp>
+      <p:grpSp>
+        <p:nvGrpSpPr>
+          <p:cNvPr id="41" name="Group 40">
+            <a:extLst>
+              <a:ext uri="{FF2B5EF4-FFF2-40B4-BE49-F238E27FC236}">
+                <a16:creationId xmlns:a16="http://schemas.microsoft.com/office/drawing/2014/main" id="{AE1C45F0-260A-458C-96ED-C1F6D2151219}"/>
+              </a:ext>
+              <a:ext uri="{C183D7F6-B498-43B3-948B-1728B52AA6E4}">
+                <adec:decorative xmlns:adec="http://schemas.microsoft.com/office/drawing/2017/decorative" val="1"/>
+              </a:ext>
+            </a:extLst>
+          </p:cNvPr>
+          <p:cNvGrpSpPr>
+            <a:grpSpLocks noGrp="1" noUngrp="1" noRot="1" noChangeAspect="1" noMove="1" noResize="1"/>
+          </p:cNvGrpSpPr>
+          <p:nvPr>
+            <p:extLst>
+              <p:ext uri="{386F3935-93C4-4BCD-93E2-E3B085C9AB24}">
+                <p16:designElem xmlns:p16="http://schemas.microsoft.com/office/powerpoint/2015/main" val="1"/>
+              </p:ext>
+            </p:extLst>
+          </p:nvPr>
+        </p:nvGrpSpPr>
+        <p:grpSpPr>
+          <a:xfrm>
+            <a:off x="0" y="1216597"/>
+            <a:ext cx="548639" cy="673460"/>
+            <a:chOff x="3940602" y="308034"/>
+            <a:chExt cx="2116791" cy="3428999"/>
+          </a:xfrm>
+          <a:solidFill>
+            <a:schemeClr val="accent4"/>
+          </a:solidFill>
+        </p:grpSpPr>
+        <p:sp>
+          <p:nvSpPr>
+            <p:cNvPr id="42" name="Rectangle 41">
+              <a:extLst>
+                <a:ext uri="{FF2B5EF4-FFF2-40B4-BE49-F238E27FC236}">
+                  <a16:creationId xmlns:a16="http://schemas.microsoft.com/office/drawing/2014/main" id="{A6604B49-AD5C-4590-B051-06C8222ECD99}"/>
+                </a:ext>
+                <a:ext uri="{C183D7F6-B498-43B3-948B-1728B52AA6E4}">
+                  <adec:decorative xmlns:adec="http://schemas.microsoft.com/office/drawing/2017/decorative" val="1"/>
+                </a:ext>
+              </a:extLst>
+            </p:cNvPr>
+            <p:cNvSpPr/>
+            <p:nvPr>
+              <p:extLst>
+                <p:ext uri="{386F3935-93C4-4BCD-93E2-E3B085C9AB24}">
+                  <p16:designElem xmlns:p16="http://schemas.microsoft.com/office/powerpoint/2015/main" val="1"/>
+                </p:ext>
+              </p:extLst>
+            </p:nvPr>
+          </p:nvSpPr>
+          <p:spPr>
+            <a:xfrm>
+              <a:off x="3940602" y="308034"/>
+              <a:ext cx="566743" cy="3428999"/>
+            </a:xfrm>
+            <a:prstGeom prst="rect">
+              <a:avLst/>
+            </a:prstGeom>
+            <a:grpFill/>
+            <a:ln>
+              <a:noFill/>
+            </a:ln>
+          </p:spPr>
+          <p:style>
+            <a:lnRef idx="2">
+              <a:schemeClr val="accent1">
+                <a:shade val="50000"/>
+              </a:schemeClr>
+            </a:lnRef>
+            <a:fillRef idx="1">
+              <a:schemeClr val="accent1"/>
+            </a:fillRef>
+            <a:effectRef idx="0">
+              <a:schemeClr val="accent1"/>
+            </a:effectRef>
+            <a:fontRef idx="minor">
+              <a:schemeClr val="lt1"/>
+            </a:fontRef>
+          </p:style>
+          <p:txBody>
+            <a:bodyPr rtlCol="0" anchor="ctr"/>
+            <a:lstStyle/>
+            <a:p>
+              <a:pPr algn="ctr"/>
+              <a:endParaRPr lang="en-US"/>
+            </a:p>
+          </p:txBody>
+        </p:sp>
+        <p:sp>
+          <p:nvSpPr>
+            <p:cNvPr id="43" name="Rectangle 42">
+              <a:extLst>
+                <a:ext uri="{FF2B5EF4-FFF2-40B4-BE49-F238E27FC236}">
+                  <a16:creationId xmlns:a16="http://schemas.microsoft.com/office/drawing/2014/main" id="{743ECCAF-29C5-4537-947C-7EA1292463DB}"/>
+                </a:ext>
+                <a:ext uri="{C183D7F6-B498-43B3-948B-1728B52AA6E4}">
+                  <adec:decorative xmlns:adec="http://schemas.microsoft.com/office/drawing/2017/decorative" val="1"/>
+                </a:ext>
+              </a:extLst>
+            </p:cNvPr>
+            <p:cNvSpPr/>
+            <p:nvPr>
+              <p:extLst>
+                <p:ext uri="{386F3935-93C4-4BCD-93E2-E3B085C9AB24}">
+                  <p16:designElem xmlns:p16="http://schemas.microsoft.com/office/powerpoint/2015/main" val="1"/>
+                </p:ext>
+              </p:extLst>
+            </p:nvPr>
+          </p:nvSpPr>
+          <p:spPr>
+            <a:xfrm>
+              <a:off x="4715626" y="308034"/>
+              <a:ext cx="566743" cy="3428999"/>
+            </a:xfrm>
+            <a:prstGeom prst="rect">
+              <a:avLst/>
+            </a:prstGeom>
+            <a:grpFill/>
+            <a:ln>
+              <a:noFill/>
+            </a:ln>
+          </p:spPr>
+          <p:style>
+            <a:lnRef idx="2">
+              <a:schemeClr val="accent1">
+                <a:shade val="50000"/>
+              </a:schemeClr>
+            </a:lnRef>
+            <a:fillRef idx="1">
+              <a:schemeClr val="accent1"/>
+            </a:fillRef>
+            <a:effectRef idx="0">
+              <a:schemeClr val="accent1"/>
+            </a:effectRef>
+            <a:fontRef idx="minor">
+              <a:schemeClr val="lt1"/>
+            </a:fontRef>
+          </p:style>
+          <p:txBody>
+            <a:bodyPr rtlCol="0" anchor="ctr"/>
+            <a:lstStyle/>
+            <a:p>
+              <a:pPr algn="ctr"/>
+              <a:endParaRPr lang="en-US"/>
+            </a:p>
+          </p:txBody>
+        </p:sp>
+        <p:sp>
+          <p:nvSpPr>
+            <p:cNvPr id="44" name="Rectangle 43">
+              <a:extLst>
+                <a:ext uri="{FF2B5EF4-FFF2-40B4-BE49-F238E27FC236}">
+                  <a16:creationId xmlns:a16="http://schemas.microsoft.com/office/drawing/2014/main" id="{ED49787B-8DE6-4467-AD0A-8DECC6E0C2D6}"/>
+                </a:ext>
+                <a:ext uri="{C183D7F6-B498-43B3-948B-1728B52AA6E4}">
+                  <adec:decorative xmlns:adec="http://schemas.microsoft.com/office/drawing/2017/decorative" val="1"/>
+                </a:ext>
+              </a:extLst>
+            </p:cNvPr>
+            <p:cNvSpPr/>
+            <p:nvPr>
+              <p:extLst>
+                <p:ext uri="{386F3935-93C4-4BCD-93E2-E3B085C9AB24}">
+                  <p16:designElem xmlns:p16="http://schemas.microsoft.com/office/powerpoint/2015/main" val="1"/>
+                </p:ext>
+              </p:extLst>
+            </p:nvPr>
+          </p:nvSpPr>
+          <p:spPr>
+            <a:xfrm>
+              <a:off x="5490650" y="308034"/>
+              <a:ext cx="566743" cy="3428999"/>
+            </a:xfrm>
+            <a:prstGeom prst="rect">
+              <a:avLst/>
+            </a:prstGeom>
+            <a:grpFill/>
+            <a:ln>
+              <a:noFill/>
+            </a:ln>
+          </p:spPr>
+          <p:style>
+            <a:lnRef idx="2">
+              <a:schemeClr val="accent1">
+                <a:shade val="50000"/>
+              </a:schemeClr>
+            </a:lnRef>
+            <a:fillRef idx="1">
+              <a:schemeClr val="accent1"/>
+            </a:fillRef>
+            <a:effectRef idx="0">
+              <a:schemeClr val="accent1"/>
+            </a:effectRef>
+            <a:fontRef idx="minor">
+              <a:schemeClr val="lt1"/>
+            </a:fontRef>
+          </p:style>
+          <p:txBody>
+            <a:bodyPr rtlCol="0" anchor="ctr"/>
+            <a:lstStyle/>
+            <a:p>
+              <a:pPr algn="ctr"/>
+              <a:endParaRPr lang="en-US"/>
+            </a:p>
+          </p:txBody>
+        </p:sp>
+      </p:grpSp>
+      <p:sp>
+        <p:nvSpPr>
+          <p:cNvPr id="46" name="Rectangle 45">
+            <a:extLst>
+              <a:ext uri="{FF2B5EF4-FFF2-40B4-BE49-F238E27FC236}">
+                <a16:creationId xmlns:a16="http://schemas.microsoft.com/office/drawing/2014/main" id="{D5B0017B-2ECA-49AF-B397-DC140825DF8D}"/>
+              </a:ext>
+              <a:ext uri="{C183D7F6-B498-43B3-948B-1728B52AA6E4}">
+                <adec:decorative xmlns:adec="http://schemas.microsoft.com/office/drawing/2017/decorative" val="1"/>
+              </a:ext>
+            </a:extLst>
+          </p:cNvPr>
+          <p:cNvSpPr>
+            <a:spLocks noGrp="1" noRot="1" noChangeAspect="1" noMove="1" noResize="1" noEditPoints="1" noAdjustHandles="1" noChangeArrowheads="1" noChangeShapeType="1" noTextEdit="1"/>
+          </p:cNvSpPr>
+          <p:nvPr>
+            <p:extLst>
+              <p:ext uri="{386F3935-93C4-4BCD-93E2-E3B085C9AB24}">
+                <p16:designElem xmlns:p16="http://schemas.microsoft.com/office/powerpoint/2015/main" val="1"/>
+              </p:ext>
+            </p:extLst>
+          </p:nvPr>
+        </p:nvSpPr>
+        <p:spPr>
+          <a:xfrm>
+            <a:off x="480059" y="613954"/>
+            <a:ext cx="8180615" cy="1894116"/>
+          </a:xfrm>
+          <a:prstGeom prst="rect">
+            <a:avLst/>
+          </a:prstGeom>
+          <a:solidFill>
+            <a:schemeClr val="bg1"/>
+          </a:solidFill>
+          <a:ln>
+            <a:noFill/>
+          </a:ln>
+          <a:effectLst>
+            <a:outerShdw blurRad="139700" dist="127000" dir="5400000" algn="t" rotWithShape="0">
+              <a:prstClr val="black">
+                <a:alpha val="15000"/>
+              </a:prstClr>
+            </a:outerShdw>
+          </a:effectLst>
+        </p:spPr>
+        <p:style>
+          <a:lnRef idx="2">
+            <a:schemeClr val="accent1">
+              <a:shade val="50000"/>
+            </a:schemeClr>
+          </a:lnRef>
+          <a:fillRef idx="1">
+            <a:schemeClr val="accent1"/>
+          </a:fillRef>
+          <a:effectRef idx="0">
+            <a:schemeClr val="accent1"/>
+          </a:effectRef>
+          <a:fontRef idx="minor">
+            <a:schemeClr val="lt1"/>
+          </a:fontRef>
+        </p:style>
+        <p:txBody>
+          <a:bodyPr rtlCol="0" anchor="ctr"/>
+          <a:lstStyle/>
+          <a:p>
+            <a:pPr algn="ctr"/>
+            <a:endParaRPr lang="en-US"/>
+          </a:p>
+        </p:txBody>
+      </p:sp>
+      <p:sp>
+        <p:nvSpPr>
+          <p:cNvPr id="2" name="Title 1"/>
+          <p:cNvSpPr>
+            <a:spLocks noGrp="1"/>
+          </p:cNvSpPr>
+          <p:nvPr>
+            <p:ph type="title"/>
+          </p:nvPr>
+        </p:nvSpPr>
+        <p:spPr>
+          <a:xfrm>
+            <a:off x="782723" y="809898"/>
+            <a:ext cx="7629757" cy="1554480"/>
+          </a:xfrm>
+        </p:spPr>
+        <p:txBody>
+          <a:bodyPr anchor="ctr">
+            <a:normAutofit/>
+          </a:bodyPr>
+          <a:lstStyle/>
+          <a:p>
+            <a:r>
+              <a:rPr lang="en-US" sz="4200"/>
+              <a:t>What is PicoFramework?</a:t>
+            </a:r>
+          </a:p>
+        </p:txBody>
+      </p:sp>
+      <p:cxnSp>
+        <p:nvCxnSpPr>
+          <p:cNvPr id="48" name="Straight Connector 47">
+            <a:extLst>
+              <a:ext uri="{FF2B5EF4-FFF2-40B4-BE49-F238E27FC236}">
+                <a16:creationId xmlns:a16="http://schemas.microsoft.com/office/drawing/2014/main" id="{6CF1BAF6-AD41-4082-B212-8A1F9A2E8779}"/>
+              </a:ext>
+              <a:ext uri="{C183D7F6-B498-43B3-948B-1728B52AA6E4}">
+                <adec:decorative xmlns:adec="http://schemas.microsoft.com/office/drawing/2017/decorative" val="1"/>
+              </a:ext>
+            </a:extLst>
+          </p:cNvPr>
+          <p:cNvCxnSpPr>
+            <a:cxnSpLocks noGrp="1" noRot="1" noChangeAspect="1" noMove="1" noResize="1" noEditPoints="1" noAdjustHandles="1" noChangeArrowheads="1" noChangeShapeType="1"/>
+          </p:cNvCxnSpPr>
+          <p:nvPr>
+            <p:extLst>
+              <p:ext uri="{386F3935-93C4-4BCD-93E2-E3B085C9AB24}">
+                <p16:designElem xmlns:p16="http://schemas.microsoft.com/office/powerpoint/2015/main" val="1"/>
+              </p:ext>
+            </p:extLst>
+          </p:nvPr>
+        </p:nvCxnSpPr>
+        <p:spPr>
+          <a:xfrm flipH="1">
+            <a:off x="628650" y="6485313"/>
+            <a:ext cx="7886700" cy="0"/>
+          </a:xfrm>
+          <a:prstGeom prst="line">
+            <a:avLst/>
+          </a:prstGeom>
+          <a:ln w="57150">
+            <a:solidFill>
+              <a:schemeClr val="accent4"/>
+            </a:solidFill>
+          </a:ln>
+        </p:spPr>
+        <p:style>
+          <a:lnRef idx="1">
+            <a:schemeClr val="accent1"/>
+          </a:lnRef>
+          <a:fillRef idx="0">
+            <a:schemeClr val="accent1"/>
+          </a:fillRef>
+          <a:effectRef idx="0">
+            <a:schemeClr val="accent1"/>
+          </a:effectRef>
+          <a:fontRef idx="minor">
+            <a:schemeClr val="tx1"/>
+          </a:fontRef>
+        </p:style>
+      </p:cxnSp>
+      <p:graphicFrame>
+        <p:nvGraphicFramePr>
+          <p:cNvPr id="5" name="Content Placeholder 2">
+            <a:extLst>
+              <a:ext uri="{FF2B5EF4-FFF2-40B4-BE49-F238E27FC236}">
+                <a16:creationId xmlns:a16="http://schemas.microsoft.com/office/drawing/2014/main" id="{025C1425-3B1A-6120-EB17-989D5BA19308}"/>
+              </a:ext>
+            </a:extLst>
+          </p:cNvPr>
+          <p:cNvGraphicFramePr>
+            <a:graphicFrameLocks noGrp="1"/>
+          </p:cNvGraphicFramePr>
+          <p:nvPr>
+            <p:ph idx="1"/>
+            <p:extLst>
+              <p:ext uri="{D42A27DB-BD31-4B8C-83A1-F6EECF244321}">
+                <p14:modId xmlns:p14="http://schemas.microsoft.com/office/powerpoint/2010/main" val="173775712"/>
+              </p:ext>
+            </p:extLst>
+          </p:nvPr>
+        </p:nvGraphicFramePr>
+        <p:xfrm>
+          <a:off x="678451" y="3017519"/>
+          <a:ext cx="7783830" cy="3209902"/>
+        </p:xfrm>
+        <a:graphic>
+          <a:graphicData uri="http://schemas.openxmlformats.org/drawingml/2006/diagram">
+            <dgm:relIds xmlns:dgm="http://schemas.openxmlformats.org/drawingml/2006/diagram" xmlns:r="http://schemas.openxmlformats.org/officeDocument/2006/relationships" r:dm="rId2" r:lo="rId3" r:qs="rId4" r:cs="rId5"/>
+          </a:graphicData>
+        </a:graphic>
+      </p:graphicFrame>
+    </p:spTree>
+  </p:cSld>
+  <p:clrMapOvr>
+    <a:masterClrMapping/>
+  </p:clrMapOvr>
+</p:sld>
+</file>
+
+<file path=ppt/slides/slide20.xml><?xml version="1.0" encoding="utf-8"?>
 <p:sld xmlns:a="http://schemas.openxmlformats.org/drawingml/2006/main" xmlns:r="http://schemas.openxmlformats.org/officeDocument/2006/relationships" xmlns:p="http://schemas.openxmlformats.org/presentationml/2006/main">
   <p:cSld>
     <p:bg>
@@ -40875,494 +41968,7 @@
 </p:sld>
 </file>
 
-<file path=ppt/slides/slide2.xml><?xml version="1.0" encoding="utf-8"?>
-<p:sld xmlns:a="http://schemas.openxmlformats.org/drawingml/2006/main" xmlns:r="http://schemas.openxmlformats.org/officeDocument/2006/relationships" xmlns:p="http://schemas.openxmlformats.org/presentationml/2006/main">
-  <p:cSld>
-    <p:bg>
-      <p:bgPr>
-        <a:solidFill>
-          <a:schemeClr val="bg1"/>
-        </a:solidFill>
-        <a:effectLst/>
-      </p:bgPr>
-    </p:bg>
-    <p:spTree>
-      <p:nvGrpSpPr>
-        <p:cNvPr id="1" name=""/>
-        <p:cNvGrpSpPr/>
-        <p:nvPr/>
-      </p:nvGrpSpPr>
-      <p:grpSpPr>
-        <a:xfrm>
-          <a:off x="0" y="0"/>
-          <a:ext cx="0" cy="0"/>
-          <a:chOff x="0" y="0"/>
-          <a:chExt cx="0" cy="0"/>
-        </a:xfrm>
-      </p:grpSpPr>
-      <p:sp useBgFill="1">
-        <p:nvSpPr>
-          <p:cNvPr id="39" name="Rectangle 38">
-            <a:extLst>
-              <a:ext uri="{FF2B5EF4-FFF2-40B4-BE49-F238E27FC236}">
-                <a16:creationId xmlns:a16="http://schemas.microsoft.com/office/drawing/2014/main" id="{56E9B3E6-E277-4D68-BA48-9CB43FFBD6E2}"/>
-              </a:ext>
-              <a:ext uri="{C183D7F6-B498-43B3-948B-1728B52AA6E4}">
-                <adec:decorative xmlns:adec="http://schemas.microsoft.com/office/drawing/2017/decorative" val="1"/>
-              </a:ext>
-            </a:extLst>
-          </p:cNvPr>
-          <p:cNvSpPr>
-            <a:spLocks noGrp="1" noRot="1" noChangeAspect="1" noMove="1" noResize="1" noEditPoints="1" noAdjustHandles="1" noChangeArrowheads="1" noChangeShapeType="1" noTextEdit="1"/>
-          </p:cNvSpPr>
-          <p:nvPr>
-            <p:extLst>
-              <p:ext uri="{386F3935-93C4-4BCD-93E2-E3B085C9AB24}">
-                <p16:designElem xmlns:p16="http://schemas.microsoft.com/office/powerpoint/2015/main" val="1"/>
-              </p:ext>
-            </p:extLst>
-          </p:nvPr>
-        </p:nvSpPr>
-        <p:spPr>
-          <a:xfrm>
-            <a:off x="0" y="0"/>
-            <a:ext cx="9143999" cy="6857365"/>
-          </a:xfrm>
-          <a:prstGeom prst="rect">
-            <a:avLst/>
-          </a:prstGeom>
-          <a:ln>
-            <a:noFill/>
-          </a:ln>
-        </p:spPr>
-        <p:style>
-          <a:lnRef idx="2">
-            <a:schemeClr val="accent1">
-              <a:shade val="50000"/>
-            </a:schemeClr>
-          </a:lnRef>
-          <a:fillRef idx="1">
-            <a:schemeClr val="accent1"/>
-          </a:fillRef>
-          <a:effectRef idx="0">
-            <a:schemeClr val="accent1"/>
-          </a:effectRef>
-          <a:fontRef idx="minor">
-            <a:schemeClr val="lt1"/>
-          </a:fontRef>
-        </p:style>
-        <p:txBody>
-          <a:bodyPr rtlCol="0" anchor="ctr"/>
-          <a:lstStyle/>
-          <a:p>
-            <a:pPr algn="ctr"/>
-            <a:endParaRPr lang="en-US"/>
-          </a:p>
-        </p:txBody>
-      </p:sp>
-      <p:grpSp>
-        <p:nvGrpSpPr>
-          <p:cNvPr id="41" name="Group 40">
-            <a:extLst>
-              <a:ext uri="{FF2B5EF4-FFF2-40B4-BE49-F238E27FC236}">
-                <a16:creationId xmlns:a16="http://schemas.microsoft.com/office/drawing/2014/main" id="{AE1C45F0-260A-458C-96ED-C1F6D2151219}"/>
-              </a:ext>
-              <a:ext uri="{C183D7F6-B498-43B3-948B-1728B52AA6E4}">
-                <adec:decorative xmlns:adec="http://schemas.microsoft.com/office/drawing/2017/decorative" val="1"/>
-              </a:ext>
-            </a:extLst>
-          </p:cNvPr>
-          <p:cNvGrpSpPr>
-            <a:grpSpLocks noGrp="1" noUngrp="1" noRot="1" noChangeAspect="1" noMove="1" noResize="1"/>
-          </p:cNvGrpSpPr>
-          <p:nvPr>
-            <p:extLst>
-              <p:ext uri="{386F3935-93C4-4BCD-93E2-E3B085C9AB24}">
-                <p16:designElem xmlns:p16="http://schemas.microsoft.com/office/powerpoint/2015/main" val="1"/>
-              </p:ext>
-            </p:extLst>
-          </p:nvPr>
-        </p:nvGrpSpPr>
-        <p:grpSpPr>
-          <a:xfrm>
-            <a:off x="0" y="1216597"/>
-            <a:ext cx="548639" cy="673460"/>
-            <a:chOff x="3940602" y="308034"/>
-            <a:chExt cx="2116791" cy="3428999"/>
-          </a:xfrm>
-          <a:solidFill>
-            <a:schemeClr val="accent4"/>
-          </a:solidFill>
-        </p:grpSpPr>
-        <p:sp>
-          <p:nvSpPr>
-            <p:cNvPr id="42" name="Rectangle 41">
-              <a:extLst>
-                <a:ext uri="{FF2B5EF4-FFF2-40B4-BE49-F238E27FC236}">
-                  <a16:creationId xmlns:a16="http://schemas.microsoft.com/office/drawing/2014/main" id="{A6604B49-AD5C-4590-B051-06C8222ECD99}"/>
-                </a:ext>
-                <a:ext uri="{C183D7F6-B498-43B3-948B-1728B52AA6E4}">
-                  <adec:decorative xmlns:adec="http://schemas.microsoft.com/office/drawing/2017/decorative" val="1"/>
-                </a:ext>
-              </a:extLst>
-            </p:cNvPr>
-            <p:cNvSpPr/>
-            <p:nvPr>
-              <p:extLst>
-                <p:ext uri="{386F3935-93C4-4BCD-93E2-E3B085C9AB24}">
-                  <p16:designElem xmlns:p16="http://schemas.microsoft.com/office/powerpoint/2015/main" val="1"/>
-                </p:ext>
-              </p:extLst>
-            </p:nvPr>
-          </p:nvSpPr>
-          <p:spPr>
-            <a:xfrm>
-              <a:off x="3940602" y="308034"/>
-              <a:ext cx="566743" cy="3428999"/>
-            </a:xfrm>
-            <a:prstGeom prst="rect">
-              <a:avLst/>
-            </a:prstGeom>
-            <a:grpFill/>
-            <a:ln>
-              <a:noFill/>
-            </a:ln>
-          </p:spPr>
-          <p:style>
-            <a:lnRef idx="2">
-              <a:schemeClr val="accent1">
-                <a:shade val="50000"/>
-              </a:schemeClr>
-            </a:lnRef>
-            <a:fillRef idx="1">
-              <a:schemeClr val="accent1"/>
-            </a:fillRef>
-            <a:effectRef idx="0">
-              <a:schemeClr val="accent1"/>
-            </a:effectRef>
-            <a:fontRef idx="minor">
-              <a:schemeClr val="lt1"/>
-            </a:fontRef>
-          </p:style>
-          <p:txBody>
-            <a:bodyPr rtlCol="0" anchor="ctr"/>
-            <a:lstStyle/>
-            <a:p>
-              <a:pPr algn="ctr"/>
-              <a:endParaRPr lang="en-US"/>
-            </a:p>
-          </p:txBody>
-        </p:sp>
-        <p:sp>
-          <p:nvSpPr>
-            <p:cNvPr id="43" name="Rectangle 42">
-              <a:extLst>
-                <a:ext uri="{FF2B5EF4-FFF2-40B4-BE49-F238E27FC236}">
-                  <a16:creationId xmlns:a16="http://schemas.microsoft.com/office/drawing/2014/main" id="{743ECCAF-29C5-4537-947C-7EA1292463DB}"/>
-                </a:ext>
-                <a:ext uri="{C183D7F6-B498-43B3-948B-1728B52AA6E4}">
-                  <adec:decorative xmlns:adec="http://schemas.microsoft.com/office/drawing/2017/decorative" val="1"/>
-                </a:ext>
-              </a:extLst>
-            </p:cNvPr>
-            <p:cNvSpPr/>
-            <p:nvPr>
-              <p:extLst>
-                <p:ext uri="{386F3935-93C4-4BCD-93E2-E3B085C9AB24}">
-                  <p16:designElem xmlns:p16="http://schemas.microsoft.com/office/powerpoint/2015/main" val="1"/>
-                </p:ext>
-              </p:extLst>
-            </p:nvPr>
-          </p:nvSpPr>
-          <p:spPr>
-            <a:xfrm>
-              <a:off x="4715626" y="308034"/>
-              <a:ext cx="566743" cy="3428999"/>
-            </a:xfrm>
-            <a:prstGeom prst="rect">
-              <a:avLst/>
-            </a:prstGeom>
-            <a:grpFill/>
-            <a:ln>
-              <a:noFill/>
-            </a:ln>
-          </p:spPr>
-          <p:style>
-            <a:lnRef idx="2">
-              <a:schemeClr val="accent1">
-                <a:shade val="50000"/>
-              </a:schemeClr>
-            </a:lnRef>
-            <a:fillRef idx="1">
-              <a:schemeClr val="accent1"/>
-            </a:fillRef>
-            <a:effectRef idx="0">
-              <a:schemeClr val="accent1"/>
-            </a:effectRef>
-            <a:fontRef idx="minor">
-              <a:schemeClr val="lt1"/>
-            </a:fontRef>
-          </p:style>
-          <p:txBody>
-            <a:bodyPr rtlCol="0" anchor="ctr"/>
-            <a:lstStyle/>
-            <a:p>
-              <a:pPr algn="ctr"/>
-              <a:endParaRPr lang="en-US"/>
-            </a:p>
-          </p:txBody>
-        </p:sp>
-        <p:sp>
-          <p:nvSpPr>
-            <p:cNvPr id="44" name="Rectangle 43">
-              <a:extLst>
-                <a:ext uri="{FF2B5EF4-FFF2-40B4-BE49-F238E27FC236}">
-                  <a16:creationId xmlns:a16="http://schemas.microsoft.com/office/drawing/2014/main" id="{ED49787B-8DE6-4467-AD0A-8DECC6E0C2D6}"/>
-                </a:ext>
-                <a:ext uri="{C183D7F6-B498-43B3-948B-1728B52AA6E4}">
-                  <adec:decorative xmlns:adec="http://schemas.microsoft.com/office/drawing/2017/decorative" val="1"/>
-                </a:ext>
-              </a:extLst>
-            </p:cNvPr>
-            <p:cNvSpPr/>
-            <p:nvPr>
-              <p:extLst>
-                <p:ext uri="{386F3935-93C4-4BCD-93E2-E3B085C9AB24}">
-                  <p16:designElem xmlns:p16="http://schemas.microsoft.com/office/powerpoint/2015/main" val="1"/>
-                </p:ext>
-              </p:extLst>
-            </p:nvPr>
-          </p:nvSpPr>
-          <p:spPr>
-            <a:xfrm>
-              <a:off x="5490650" y="308034"/>
-              <a:ext cx="566743" cy="3428999"/>
-            </a:xfrm>
-            <a:prstGeom prst="rect">
-              <a:avLst/>
-            </a:prstGeom>
-            <a:grpFill/>
-            <a:ln>
-              <a:noFill/>
-            </a:ln>
-          </p:spPr>
-          <p:style>
-            <a:lnRef idx="2">
-              <a:schemeClr val="accent1">
-                <a:shade val="50000"/>
-              </a:schemeClr>
-            </a:lnRef>
-            <a:fillRef idx="1">
-              <a:schemeClr val="accent1"/>
-            </a:fillRef>
-            <a:effectRef idx="0">
-              <a:schemeClr val="accent1"/>
-            </a:effectRef>
-            <a:fontRef idx="minor">
-              <a:schemeClr val="lt1"/>
-            </a:fontRef>
-          </p:style>
-          <p:txBody>
-            <a:bodyPr rtlCol="0" anchor="ctr"/>
-            <a:lstStyle/>
-            <a:p>
-              <a:pPr algn="ctr"/>
-              <a:endParaRPr lang="en-US"/>
-            </a:p>
-          </p:txBody>
-        </p:sp>
-      </p:grpSp>
-      <p:sp>
-        <p:nvSpPr>
-          <p:cNvPr id="46" name="Rectangle 45">
-            <a:extLst>
-              <a:ext uri="{FF2B5EF4-FFF2-40B4-BE49-F238E27FC236}">
-                <a16:creationId xmlns:a16="http://schemas.microsoft.com/office/drawing/2014/main" id="{D5B0017B-2ECA-49AF-B397-DC140825DF8D}"/>
-              </a:ext>
-              <a:ext uri="{C183D7F6-B498-43B3-948B-1728B52AA6E4}">
-                <adec:decorative xmlns:adec="http://schemas.microsoft.com/office/drawing/2017/decorative" val="1"/>
-              </a:ext>
-            </a:extLst>
-          </p:cNvPr>
-          <p:cNvSpPr>
-            <a:spLocks noGrp="1" noRot="1" noChangeAspect="1" noMove="1" noResize="1" noEditPoints="1" noAdjustHandles="1" noChangeArrowheads="1" noChangeShapeType="1" noTextEdit="1"/>
-          </p:cNvSpPr>
-          <p:nvPr>
-            <p:extLst>
-              <p:ext uri="{386F3935-93C4-4BCD-93E2-E3B085C9AB24}">
-                <p16:designElem xmlns:p16="http://schemas.microsoft.com/office/powerpoint/2015/main" val="1"/>
-              </p:ext>
-            </p:extLst>
-          </p:nvPr>
-        </p:nvSpPr>
-        <p:spPr>
-          <a:xfrm>
-            <a:off x="480059" y="613954"/>
-            <a:ext cx="8180615" cy="1894116"/>
-          </a:xfrm>
-          <a:prstGeom prst="rect">
-            <a:avLst/>
-          </a:prstGeom>
-          <a:solidFill>
-            <a:schemeClr val="bg1"/>
-          </a:solidFill>
-          <a:ln>
-            <a:noFill/>
-          </a:ln>
-          <a:effectLst>
-            <a:outerShdw blurRad="139700" dist="127000" dir="5400000" algn="t" rotWithShape="0">
-              <a:prstClr val="black">
-                <a:alpha val="15000"/>
-              </a:prstClr>
-            </a:outerShdw>
-          </a:effectLst>
-        </p:spPr>
-        <p:style>
-          <a:lnRef idx="2">
-            <a:schemeClr val="accent1">
-              <a:shade val="50000"/>
-            </a:schemeClr>
-          </a:lnRef>
-          <a:fillRef idx="1">
-            <a:schemeClr val="accent1"/>
-          </a:fillRef>
-          <a:effectRef idx="0">
-            <a:schemeClr val="accent1"/>
-          </a:effectRef>
-          <a:fontRef idx="minor">
-            <a:schemeClr val="lt1"/>
-          </a:fontRef>
-        </p:style>
-        <p:txBody>
-          <a:bodyPr rtlCol="0" anchor="ctr"/>
-          <a:lstStyle/>
-          <a:p>
-            <a:pPr algn="ctr"/>
-            <a:endParaRPr lang="en-US"/>
-          </a:p>
-        </p:txBody>
-      </p:sp>
-      <p:sp>
-        <p:nvSpPr>
-          <p:cNvPr id="2" name="Title 1"/>
-          <p:cNvSpPr>
-            <a:spLocks noGrp="1"/>
-          </p:cNvSpPr>
-          <p:nvPr>
-            <p:ph type="title"/>
-          </p:nvPr>
-        </p:nvSpPr>
-        <p:spPr>
-          <a:xfrm>
-            <a:off x="782723" y="809898"/>
-            <a:ext cx="7629757" cy="1554480"/>
-          </a:xfrm>
-        </p:spPr>
-        <p:txBody>
-          <a:bodyPr anchor="ctr">
-            <a:normAutofit/>
-          </a:bodyPr>
-          <a:lstStyle/>
-          <a:p>
-            <a:r>
-              <a:rPr lang="en-US" sz="4200"/>
-              <a:t>What is PicoFramework?</a:t>
-            </a:r>
-          </a:p>
-        </p:txBody>
-      </p:sp>
-      <p:cxnSp>
-        <p:nvCxnSpPr>
-          <p:cNvPr id="48" name="Straight Connector 47">
-            <a:extLst>
-              <a:ext uri="{FF2B5EF4-FFF2-40B4-BE49-F238E27FC236}">
-                <a16:creationId xmlns:a16="http://schemas.microsoft.com/office/drawing/2014/main" id="{6CF1BAF6-AD41-4082-B212-8A1F9A2E8779}"/>
-              </a:ext>
-              <a:ext uri="{C183D7F6-B498-43B3-948B-1728B52AA6E4}">
-                <adec:decorative xmlns:adec="http://schemas.microsoft.com/office/drawing/2017/decorative" val="1"/>
-              </a:ext>
-            </a:extLst>
-          </p:cNvPr>
-          <p:cNvCxnSpPr>
-            <a:cxnSpLocks noGrp="1" noRot="1" noChangeAspect="1" noMove="1" noResize="1" noEditPoints="1" noAdjustHandles="1" noChangeArrowheads="1" noChangeShapeType="1"/>
-          </p:cNvCxnSpPr>
-          <p:nvPr>
-            <p:extLst>
-              <p:ext uri="{386F3935-93C4-4BCD-93E2-E3B085C9AB24}">
-                <p16:designElem xmlns:p16="http://schemas.microsoft.com/office/powerpoint/2015/main" val="1"/>
-              </p:ext>
-            </p:extLst>
-          </p:nvPr>
-        </p:nvCxnSpPr>
-        <p:spPr>
-          <a:xfrm flipH="1">
-            <a:off x="628650" y="6485313"/>
-            <a:ext cx="7886700" cy="0"/>
-          </a:xfrm>
-          <a:prstGeom prst="line">
-            <a:avLst/>
-          </a:prstGeom>
-          <a:ln w="57150">
-            <a:solidFill>
-              <a:schemeClr val="accent4"/>
-            </a:solidFill>
-          </a:ln>
-        </p:spPr>
-        <p:style>
-          <a:lnRef idx="1">
-            <a:schemeClr val="accent1"/>
-          </a:lnRef>
-          <a:fillRef idx="0">
-            <a:schemeClr val="accent1"/>
-          </a:fillRef>
-          <a:effectRef idx="0">
-            <a:schemeClr val="accent1"/>
-          </a:effectRef>
-          <a:fontRef idx="minor">
-            <a:schemeClr val="tx1"/>
-          </a:fontRef>
-        </p:style>
-      </p:cxnSp>
-      <p:graphicFrame>
-        <p:nvGraphicFramePr>
-          <p:cNvPr id="5" name="Content Placeholder 2">
-            <a:extLst>
-              <a:ext uri="{FF2B5EF4-FFF2-40B4-BE49-F238E27FC236}">
-                <a16:creationId xmlns:a16="http://schemas.microsoft.com/office/drawing/2014/main" id="{025C1425-3B1A-6120-EB17-989D5BA19308}"/>
-              </a:ext>
-            </a:extLst>
-          </p:cNvPr>
-          <p:cNvGraphicFramePr>
-            <a:graphicFrameLocks noGrp="1"/>
-          </p:cNvGraphicFramePr>
-          <p:nvPr>
-            <p:ph idx="1"/>
-            <p:extLst>
-              <p:ext uri="{D42A27DB-BD31-4B8C-83A1-F6EECF244321}">
-                <p14:modId xmlns:p14="http://schemas.microsoft.com/office/powerpoint/2010/main" val="173775712"/>
-              </p:ext>
-            </p:extLst>
-          </p:nvPr>
-        </p:nvGraphicFramePr>
-        <p:xfrm>
-          <a:off x="678451" y="3017519"/>
-          <a:ext cx="7783830" cy="3209902"/>
-        </p:xfrm>
-        <a:graphic>
-          <a:graphicData uri="http://schemas.openxmlformats.org/drawingml/2006/diagram">
-            <dgm:relIds xmlns:dgm="http://schemas.openxmlformats.org/drawingml/2006/diagram" xmlns:r="http://schemas.openxmlformats.org/officeDocument/2006/relationships" r:dm="rId2" r:lo="rId3" r:qs="rId4" r:cs="rId5"/>
-          </a:graphicData>
-        </a:graphic>
-      </p:graphicFrame>
-    </p:spTree>
-  </p:cSld>
-  <p:clrMapOvr>
-    <a:masterClrMapping/>
-  </p:clrMapOvr>
-</p:sld>
-</file>
-
-<file path=ppt/slides/slide20.xml><?xml version="1.0" encoding="utf-8"?>
+<file path=ppt/slides/slide21.xml><?xml version="1.0" encoding="utf-8"?>
 <p:sld xmlns:a="http://schemas.openxmlformats.org/drawingml/2006/main" xmlns:r="http://schemas.openxmlformats.org/officeDocument/2006/relationships" xmlns:p="http://schemas.openxmlformats.org/presentationml/2006/main">
   <p:cSld>
     <p:bg>
@@ -42122,7 +42728,7 @@
 </p:sld>
 </file>
 
-<file path=ppt/slides/slide21.xml><?xml version="1.0" encoding="utf-8"?>
+<file path=ppt/slides/slide22.xml><?xml version="1.0" encoding="utf-8"?>
 <p:sld xmlns:a="http://schemas.openxmlformats.org/drawingml/2006/main" xmlns:r="http://schemas.openxmlformats.org/officeDocument/2006/relationships" xmlns:p="http://schemas.openxmlformats.org/presentationml/2006/main">
   <p:cSld>
     <p:spTree>
@@ -42194,7 +42800,7 @@
 </p:sld>
 </file>
 
-<file path=ppt/slides/slide22.xml><?xml version="1.0" encoding="utf-8"?>
+<file path=ppt/slides/slide23.xml><?xml version="1.0" encoding="utf-8"?>
 <p:sld xmlns:a="http://schemas.openxmlformats.org/drawingml/2006/main" xmlns:r="http://schemas.openxmlformats.org/officeDocument/2006/relationships" xmlns:p="http://schemas.openxmlformats.org/presentationml/2006/main">
   <p:cSld>
     <p:bg>
@@ -42593,7 +43199,7 @@
 </p:sld>
 </file>
 
-<file path=ppt/slides/slide23.xml><?xml version="1.0" encoding="utf-8"?>
+<file path=ppt/slides/slide24.xml><?xml version="1.0" encoding="utf-8"?>
 <p:sld xmlns:a="http://schemas.openxmlformats.org/drawingml/2006/main" xmlns:r="http://schemas.openxmlformats.org/officeDocument/2006/relationships" xmlns:p="http://schemas.openxmlformats.org/presentationml/2006/main">
   <p:cSld>
     <p:bg>
@@ -43082,7 +43688,7 @@
 </p:sld>
 </file>
 
-<file path=ppt/slides/slide24.xml><?xml version="1.0" encoding="utf-8"?>
+<file path=ppt/slides/slide25.xml><?xml version="1.0" encoding="utf-8"?>
 <p:sld xmlns:a="http://schemas.openxmlformats.org/drawingml/2006/main" xmlns:r="http://schemas.openxmlformats.org/officeDocument/2006/relationships" xmlns:p="http://schemas.openxmlformats.org/presentationml/2006/main">
   <p:cSld>
     <p:bg>
@@ -43380,7 +43986,7 @@
 </p:sld>
 </file>
 
-<file path=ppt/slides/slide25.xml><?xml version="1.0" encoding="utf-8"?>
+<file path=ppt/slides/slide26.xml><?xml version="1.0" encoding="utf-8"?>
 <p:sld xmlns:a="http://schemas.openxmlformats.org/drawingml/2006/main" xmlns:r="http://schemas.openxmlformats.org/officeDocument/2006/relationships" xmlns:p="http://schemas.openxmlformats.org/presentationml/2006/main">
   <p:cSld>
     <p:bg>
@@ -43779,7 +44385,7 @@
 </p:sld>
 </file>
 
-<file path=ppt/slides/slide26.xml><?xml version="1.0" encoding="utf-8"?>
+<file path=ppt/slides/slide27.xml><?xml version="1.0" encoding="utf-8"?>
 <p:sld xmlns:a="http://schemas.openxmlformats.org/drawingml/2006/main" xmlns:r="http://schemas.openxmlformats.org/officeDocument/2006/relationships" xmlns:p="http://schemas.openxmlformats.org/presentationml/2006/main">
   <p:cSld>
     <p:bg>
@@ -47829,27 +48435,7 @@
                 <a:effectLst/>
                 <a:latin typeface="Menlo" panose="020B0609030804020204" pitchFamily="49" charset="0"/>
               </a:rPr>
-              <a:t>) </a:t>
-            </a:r>
-            <a:r>
-              <a:rPr lang="en-US" sz="800" b="0">
-                <a:solidFill>
-                  <a:srgbClr val="000000"/>
-                </a:solidFill>
-                <a:effectLst/>
-                <a:latin typeface="Menlo" panose="020B0609030804020204" pitchFamily="49" charset="0"/>
-              </a:rPr>
-              <a:t>{// app </a:t>
-            </a:r>
-            <a:r>
-              <a:rPr lang="en-US" sz="800" b="0" dirty="0">
-                <a:solidFill>
-                  <a:srgbClr val="000000"/>
-                </a:solidFill>
-                <a:effectLst/>
-                <a:latin typeface="Menlo" panose="020B0609030804020204" pitchFamily="49" charset="0"/>
-              </a:rPr>
-              <a:t>loop}</a:t>
+              <a:t>) {// app loop}</a:t>
             </a:r>
           </a:p>
           <a:p>
@@ -47945,14 +48531,6 @@
 <file path=ppt/slides/slide9.xml><?xml version="1.0" encoding="utf-8"?>
 <p:sld xmlns:a="http://schemas.openxmlformats.org/drawingml/2006/main" xmlns:r="http://schemas.openxmlformats.org/officeDocument/2006/relationships" xmlns:p="http://schemas.openxmlformats.org/presentationml/2006/main">
   <p:cSld>
-    <p:bg>
-      <p:bgPr>
-        <a:solidFill>
-          <a:schemeClr val="bg1"/>
-        </a:solidFill>
-        <a:effectLst/>
-      </p:bgPr>
-    </p:bg>
     <p:spTree>
       <p:nvGrpSpPr>
         <p:cNvPr id="1" name=""/>
@@ -47967,385 +48545,15 @@
           <a:chExt cx="0" cy="0"/>
         </a:xfrm>
       </p:grpSpPr>
-      <p:sp useBgFill="1">
+      <p:sp>
         <p:nvSpPr>
-          <p:cNvPr id="8" name="Rectangle 7">
+          <p:cNvPr id="2" name="Title 1">
             <a:extLst>
               <a:ext uri="{FF2B5EF4-FFF2-40B4-BE49-F238E27FC236}">
-                <a16:creationId xmlns:a16="http://schemas.microsoft.com/office/drawing/2014/main" id="{1B15ED52-F352-441B-82BF-E0EA34836D08}"/>
-              </a:ext>
-              <a:ext uri="{C183D7F6-B498-43B3-948B-1728B52AA6E4}">
-                <adec:decorative xmlns:adec="http://schemas.microsoft.com/office/drawing/2017/decorative" val="1"/>
+                <a16:creationId xmlns:a16="http://schemas.microsoft.com/office/drawing/2014/main" id="{D7448843-D75F-4FFB-088A-562702C88220}"/>
               </a:ext>
             </a:extLst>
           </p:cNvPr>
-          <p:cNvSpPr>
-            <a:spLocks noGrp="1" noRot="1" noChangeAspect="1" noMove="1" noResize="1" noEditPoints="1" noAdjustHandles="1" noChangeArrowheads="1" noChangeShapeType="1" noTextEdit="1"/>
-          </p:cNvSpPr>
-          <p:nvPr>
-            <p:extLst>
-              <p:ext uri="{386F3935-93C4-4BCD-93E2-E3B085C9AB24}">
-                <p16:designElem xmlns:p16="http://schemas.microsoft.com/office/powerpoint/2015/main" val="1"/>
-              </p:ext>
-            </p:extLst>
-          </p:nvPr>
-        </p:nvSpPr>
-        <p:spPr>
-          <a:xfrm>
-            <a:off x="0" y="0"/>
-            <a:ext cx="9144000" cy="6858000"/>
-          </a:xfrm>
-          <a:prstGeom prst="rect">
-            <a:avLst/>
-          </a:prstGeom>
-          <a:ln w="12700" cap="flat" cmpd="sng" algn="ctr">
-            <a:noFill/>
-            <a:prstDash val="solid"/>
-            <a:miter lim="800000"/>
-          </a:ln>
-          <a:effectLst/>
-          <a:extLst>
-            <a:ext uri="{91240B29-F687-4F45-9708-019B960494DF}">
-              <a14:hiddenLine xmlns:a14="http://schemas.microsoft.com/office/drawing/2010/main" w="12700" cap="flat" cmpd="sng" algn="ctr">
-                <a:solidFill>
-                  <a:schemeClr val="accent1">
-                    <a:shade val="50000"/>
-                  </a:schemeClr>
-                </a:solidFill>
-                <a:prstDash val="solid"/>
-                <a:miter lim="800000"/>
-              </a14:hiddenLine>
-            </a:ext>
-          </a:extLst>
-        </p:spPr>
-        <p:style>
-          <a:lnRef idx="2">
-            <a:schemeClr val="accent1">
-              <a:shade val="50000"/>
-            </a:schemeClr>
-          </a:lnRef>
-          <a:fillRef idx="1">
-            <a:schemeClr val="accent1"/>
-          </a:fillRef>
-          <a:effectRef idx="0">
-            <a:schemeClr val="accent1"/>
-          </a:effectRef>
-          <a:fontRef idx="minor">
-            <a:schemeClr val="lt1"/>
-          </a:fontRef>
-        </p:style>
-        <p:txBody>
-          <a:bodyPr rtlCol="0" anchor="ctr"/>
-          <a:lstStyle/>
-          <a:p>
-            <a:pPr algn="ctr"/>
-            <a:endParaRPr lang="en-US"/>
-          </a:p>
-        </p:txBody>
-      </p:sp>
-      <p:sp>
-        <p:nvSpPr>
-          <p:cNvPr id="10" name="Rectangle 9">
-            <a:extLst>
-              <a:ext uri="{FF2B5EF4-FFF2-40B4-BE49-F238E27FC236}">
-                <a16:creationId xmlns:a16="http://schemas.microsoft.com/office/drawing/2014/main" id="{3B2E3793-BFE6-45A2-9B7B-E18844431C99}"/>
-              </a:ext>
-              <a:ext uri="{C183D7F6-B498-43B3-948B-1728B52AA6E4}">
-                <adec:decorative xmlns:adec="http://schemas.microsoft.com/office/drawing/2017/decorative" val="1"/>
-              </a:ext>
-            </a:extLst>
-          </p:cNvPr>
-          <p:cNvSpPr>
-            <a:spLocks noGrp="1" noRot="1" noChangeAspect="1" noMove="1" noResize="1" noEditPoints="1" noAdjustHandles="1" noChangeArrowheads="1" noChangeShapeType="1" noTextEdit="1"/>
-          </p:cNvSpPr>
-          <p:nvPr>
-            <p:extLst>
-              <p:ext uri="{386F3935-93C4-4BCD-93E2-E3B085C9AB24}">
-                <p16:designElem xmlns:p16="http://schemas.microsoft.com/office/powerpoint/2015/main" val="1"/>
-              </p:ext>
-            </p:extLst>
-          </p:nvPr>
-        </p:nvSpPr>
-        <p:spPr>
-          <a:xfrm flipH="1">
-            <a:off x="0" y="-1"/>
-            <a:ext cx="9143997" cy="1590742"/>
-          </a:xfrm>
-          <a:prstGeom prst="rect">
-            <a:avLst/>
-          </a:prstGeom>
-          <a:gradFill>
-            <a:gsLst>
-              <a:gs pos="0">
-                <a:srgbClr val="000000"/>
-              </a:gs>
-              <a:gs pos="100000">
-                <a:schemeClr val="accent1">
-                  <a:lumMod val="75000"/>
-                </a:schemeClr>
-              </a:gs>
-            </a:gsLst>
-            <a:lin ang="8400000" scaled="0"/>
-          </a:gradFill>
-          <a:ln>
-            <a:noFill/>
-          </a:ln>
-        </p:spPr>
-        <p:style>
-          <a:lnRef idx="2">
-            <a:schemeClr val="accent1">
-              <a:shade val="50000"/>
-            </a:schemeClr>
-          </a:lnRef>
-          <a:fillRef idx="1">
-            <a:schemeClr val="accent1"/>
-          </a:fillRef>
-          <a:effectRef idx="0">
-            <a:schemeClr val="accent1"/>
-          </a:effectRef>
-          <a:fontRef idx="minor">
-            <a:schemeClr val="lt1"/>
-          </a:fontRef>
-        </p:style>
-        <p:txBody>
-          <a:bodyPr rtlCol="0" anchor="ctr"/>
-          <a:lstStyle/>
-          <a:p>
-            <a:pPr algn="ctr"/>
-            <a:endParaRPr lang="en-US"/>
-          </a:p>
-        </p:txBody>
-      </p:sp>
-      <p:sp>
-        <p:nvSpPr>
-          <p:cNvPr id="12" name="Rectangle 11">
-            <a:extLst>
-              <a:ext uri="{FF2B5EF4-FFF2-40B4-BE49-F238E27FC236}">
-                <a16:creationId xmlns:a16="http://schemas.microsoft.com/office/drawing/2014/main" id="{BC4C4868-CB8F-4AF9-9CDB-8108F2C19B67}"/>
-              </a:ext>
-              <a:ext uri="{C183D7F6-B498-43B3-948B-1728B52AA6E4}">
-                <adec:decorative xmlns:adec="http://schemas.microsoft.com/office/drawing/2017/decorative" val="1"/>
-              </a:ext>
-            </a:extLst>
-          </p:cNvPr>
-          <p:cNvSpPr>
-            <a:spLocks noGrp="1" noRot="1" noChangeAspect="1" noMove="1" noResize="1" noEditPoints="1" noAdjustHandles="1" noChangeArrowheads="1" noChangeShapeType="1" noTextEdit="1"/>
-          </p:cNvSpPr>
-          <p:nvPr>
-            <p:extLst>
-              <p:ext uri="{386F3935-93C4-4BCD-93E2-E3B085C9AB24}">
-                <p16:designElem xmlns:p16="http://schemas.microsoft.com/office/powerpoint/2015/main" val="1"/>
-              </p:ext>
-            </p:extLst>
-          </p:nvPr>
-        </p:nvSpPr>
-        <p:spPr>
-          <a:xfrm rot="10800000" flipH="1">
-            <a:off x="-2" y="0"/>
-            <a:ext cx="6086479" cy="1590742"/>
-          </a:xfrm>
-          <a:prstGeom prst="rect">
-            <a:avLst/>
-          </a:prstGeom>
-          <a:gradFill>
-            <a:gsLst>
-              <a:gs pos="20000">
-                <a:schemeClr val="accent1">
-                  <a:alpha val="0"/>
-                </a:schemeClr>
-              </a:gs>
-              <a:gs pos="100000">
-                <a:schemeClr val="accent1">
-                  <a:lumMod val="50000"/>
-                  <a:alpha val="55000"/>
-                </a:schemeClr>
-              </a:gs>
-            </a:gsLst>
-            <a:lin ang="13800000" scaled="0"/>
-          </a:gradFill>
-          <a:ln>
-            <a:noFill/>
-          </a:ln>
-        </p:spPr>
-        <p:style>
-          <a:lnRef idx="2">
-            <a:schemeClr val="accent1">
-              <a:shade val="50000"/>
-            </a:schemeClr>
-          </a:lnRef>
-          <a:fillRef idx="1">
-            <a:schemeClr val="accent1"/>
-          </a:fillRef>
-          <a:effectRef idx="0">
-            <a:schemeClr val="accent1"/>
-          </a:effectRef>
-          <a:fontRef idx="minor">
-            <a:schemeClr val="lt1"/>
-          </a:fontRef>
-        </p:style>
-        <p:txBody>
-          <a:bodyPr rtlCol="0" anchor="ctr"/>
-          <a:lstStyle/>
-          <a:p>
-            <a:pPr algn="ctr"/>
-            <a:endParaRPr lang="en-US"/>
-          </a:p>
-        </p:txBody>
-      </p:sp>
-      <p:sp>
-        <p:nvSpPr>
-          <p:cNvPr id="14" name="Rectangle 13">
-            <a:extLst>
-              <a:ext uri="{FF2B5EF4-FFF2-40B4-BE49-F238E27FC236}">
-                <a16:creationId xmlns:a16="http://schemas.microsoft.com/office/drawing/2014/main" id="{375E0459-6403-40CD-989D-56A4407CA12E}"/>
-              </a:ext>
-              <a:ext uri="{C183D7F6-B498-43B3-948B-1728B52AA6E4}">
-                <adec:decorative xmlns:adec="http://schemas.microsoft.com/office/drawing/2017/decorative" val="1"/>
-              </a:ext>
-            </a:extLst>
-          </p:cNvPr>
-          <p:cNvSpPr>
-            <a:spLocks noGrp="1" noRot="1" noChangeAspect="1" noMove="1" noResize="1" noEditPoints="1" noAdjustHandles="1" noChangeArrowheads="1" noChangeShapeType="1" noTextEdit="1"/>
-          </p:cNvSpPr>
-          <p:nvPr>
-            <p:extLst>
-              <p:ext uri="{386F3935-93C4-4BCD-93E2-E3B085C9AB24}">
-                <p16:designElem xmlns:p16="http://schemas.microsoft.com/office/powerpoint/2015/main" val="1"/>
-              </p:ext>
-            </p:extLst>
-          </p:nvPr>
-        </p:nvSpPr>
-        <p:spPr>
-          <a:xfrm flipH="1">
-            <a:off x="6086474" y="-1"/>
-            <a:ext cx="3057523" cy="1590742"/>
-          </a:xfrm>
-          <a:prstGeom prst="rect">
-            <a:avLst/>
-          </a:prstGeom>
-          <a:gradFill>
-            <a:gsLst>
-              <a:gs pos="0">
-                <a:schemeClr val="accent1">
-                  <a:alpha val="66000"/>
-                </a:schemeClr>
-              </a:gs>
-              <a:gs pos="100000">
-                <a:srgbClr val="000000">
-                  <a:alpha val="30000"/>
-                </a:srgbClr>
-              </a:gs>
-            </a:gsLst>
-            <a:lin ang="13200000" scaled="0"/>
-          </a:gradFill>
-          <a:ln>
-            <a:noFill/>
-          </a:ln>
-        </p:spPr>
-        <p:style>
-          <a:lnRef idx="2">
-            <a:schemeClr val="accent1">
-              <a:shade val="50000"/>
-            </a:schemeClr>
-          </a:lnRef>
-          <a:fillRef idx="1">
-            <a:schemeClr val="accent1"/>
-          </a:fillRef>
-          <a:effectRef idx="0">
-            <a:schemeClr val="accent1"/>
-          </a:effectRef>
-          <a:fontRef idx="minor">
-            <a:schemeClr val="lt1"/>
-          </a:fontRef>
-        </p:style>
-        <p:txBody>
-          <a:bodyPr rtlCol="0" anchor="ctr"/>
-          <a:lstStyle/>
-          <a:p>
-            <a:pPr algn="ctr"/>
-            <a:endParaRPr lang="en-US"/>
-          </a:p>
-        </p:txBody>
-      </p:sp>
-      <p:sp>
-        <p:nvSpPr>
-          <p:cNvPr id="16" name="Rectangle 15">
-            <a:extLst>
-              <a:ext uri="{FF2B5EF4-FFF2-40B4-BE49-F238E27FC236}">
-                <a16:creationId xmlns:a16="http://schemas.microsoft.com/office/drawing/2014/main" id="{53E5B1A8-3AC9-4BD1-9BBC-78CA94F2D1BA}"/>
-              </a:ext>
-              <a:ext uri="{C183D7F6-B498-43B3-948B-1728B52AA6E4}">
-                <adec:decorative xmlns:adec="http://schemas.microsoft.com/office/drawing/2017/decorative" val="1"/>
-              </a:ext>
-            </a:extLst>
-          </p:cNvPr>
-          <p:cNvSpPr>
-            <a:spLocks noGrp="1" noRot="1" noChangeAspect="1" noMove="1" noResize="1" noEditPoints="1" noAdjustHandles="1" noChangeArrowheads="1" noChangeShapeType="1" noTextEdit="1"/>
-          </p:cNvSpPr>
-          <p:nvPr>
-            <p:extLst>
-              <p:ext uri="{386F3935-93C4-4BCD-93E2-E3B085C9AB24}">
-                <p16:designElem xmlns:p16="http://schemas.microsoft.com/office/powerpoint/2015/main" val="1"/>
-              </p:ext>
-            </p:extLst>
-          </p:nvPr>
-        </p:nvSpPr>
-        <p:spPr>
-          <a:xfrm>
-            <a:off x="344512" y="-1"/>
-            <a:ext cx="8799485" cy="1597433"/>
-          </a:xfrm>
-          <a:prstGeom prst="rect">
-            <a:avLst/>
-          </a:prstGeom>
-          <a:gradFill>
-            <a:gsLst>
-              <a:gs pos="50000">
-                <a:srgbClr val="000000">
-                  <a:alpha val="0"/>
-                </a:srgbClr>
-              </a:gs>
-              <a:gs pos="99000">
-                <a:schemeClr val="accent1">
-                  <a:lumMod val="50000"/>
-                  <a:alpha val="52000"/>
-                </a:schemeClr>
-              </a:gs>
-            </a:gsLst>
-            <a:lin ang="16800000" scaled="0"/>
-          </a:gradFill>
-          <a:ln>
-            <a:noFill/>
-          </a:ln>
-        </p:spPr>
-        <p:style>
-          <a:lnRef idx="2">
-            <a:schemeClr val="accent1">
-              <a:shade val="50000"/>
-            </a:schemeClr>
-          </a:lnRef>
-          <a:fillRef idx="1">
-            <a:schemeClr val="accent1"/>
-          </a:fillRef>
-          <a:effectRef idx="0">
-            <a:schemeClr val="accent1"/>
-          </a:effectRef>
-          <a:fontRef idx="minor">
-            <a:schemeClr val="lt1"/>
-          </a:fontRef>
-        </p:style>
-        <p:txBody>
-          <a:bodyPr rtlCol="0" anchor="ctr"/>
-          <a:lstStyle/>
-          <a:p>
-            <a:pPr algn="ctr"/>
-            <a:endParaRPr lang="en-US"/>
-          </a:p>
-        </p:txBody>
-      </p:sp>
-      <p:sp>
-        <p:nvSpPr>
-          <p:cNvPr id="2" name="Title 1"/>
           <p:cNvSpPr>
             <a:spLocks noGrp="1"/>
           </p:cNvSpPr>
@@ -48353,32 +48561,27 @@
             <p:ph type="title"/>
           </p:nvPr>
         </p:nvSpPr>
-        <p:spPr>
-          <a:xfrm>
-            <a:off x="1028699" y="294538"/>
-            <a:ext cx="7421963" cy="1033669"/>
-          </a:xfrm>
-        </p:spPr>
+        <p:spPr/>
         <p:txBody>
-          <a:bodyPr>
-            <a:normAutofit/>
-          </a:bodyPr>
+          <a:bodyPr/>
           <a:lstStyle/>
           <a:p>
             <a:r>
-              <a:rPr lang="en-US" sz="3500">
-                <a:solidFill>
-                  <a:srgbClr val="FFFFFF"/>
-                </a:solidFill>
-              </a:rPr>
-              <a:t>Routing System (Express.js-style)</a:t>
+              <a:rPr lang="en-US" dirty="0"/>
+              <a:t>The App</a:t>
             </a:r>
           </a:p>
         </p:txBody>
       </p:sp>
       <p:sp>
         <p:nvSpPr>
-          <p:cNvPr id="3" name="Content Placeholder 2"/>
+          <p:cNvPr id="3" name="Content Placeholder 2">
+            <a:extLst>
+              <a:ext uri="{FF2B5EF4-FFF2-40B4-BE49-F238E27FC236}">
+                <a16:creationId xmlns:a16="http://schemas.microsoft.com/office/drawing/2014/main" id="{06338274-9889-8824-375B-7EC9606B3265}"/>
+              </a:ext>
+            </a:extLst>
+          </p:cNvPr>
           <p:cNvSpPr>
             <a:spLocks noGrp="1"/>
           </p:cNvSpPr>
@@ -48386,158 +48589,194 @@
             <p:ph idx="1"/>
           </p:nvPr>
         </p:nvSpPr>
-        <p:spPr>
-          <a:xfrm>
-            <a:off x="1028699" y="2318197"/>
-            <a:ext cx="7293023" cy="3683358"/>
-          </a:xfrm>
-        </p:spPr>
+        <p:spPr/>
         <p:txBody>
-          <a:bodyPr anchor="ctr">
-            <a:normAutofit/>
+          <a:bodyPr>
+            <a:normAutofit fontScale="47500" lnSpcReduction="20000"/>
           </a:bodyPr>
           <a:lstStyle/>
           <a:p>
-            <a:pPr>
-              <a:lnSpc>
-                <a:spcPct val="90000"/>
-              </a:lnSpc>
-            </a:pPr>
-            <a:r>
-              <a:rPr lang="en-US" sz="1700"/>
-              <a:t>Add routes via router.addRoute(method, path, handler)</a:t>
-            </a:r>
-          </a:p>
-          <a:p>
-            <a:pPr>
-              <a:lnSpc>
-                <a:spcPct val="90000"/>
-              </a:lnSpc>
-            </a:pPr>
-            <a:r>
-              <a:rPr lang="en-US" sz="1700"/>
-              <a:t>REST-friendly: GET, POST, PUT, DELETE</a:t>
-            </a:r>
-          </a:p>
-          <a:p>
-            <a:pPr>
-              <a:lnSpc>
-                <a:spcPct val="90000"/>
-              </a:lnSpc>
-            </a:pPr>
-            <a:r>
-              <a:rPr lang="en-US" sz="1700"/>
-              <a:t>Lambdas or method pointers as handlers</a:t>
-            </a:r>
-          </a:p>
-          <a:p>
-            <a:pPr>
-              <a:lnSpc>
-                <a:spcPct val="90000"/>
-              </a:lnSpc>
-            </a:pPr>
-            <a:r>
-              <a:rPr lang="en-US" sz="1700"/>
-              <a:t>Per-route and global middleware</a:t>
-            </a:r>
-          </a:p>
-          <a:p>
-            <a:pPr>
-              <a:lnSpc>
-                <a:spcPct val="90000"/>
-              </a:lnSpc>
-            </a:pPr>
-            <a:r>
-              <a:rPr lang="en-US" sz="1700"/>
-              <a:t>Path parsing and matching with variables</a:t>
-            </a:r>
-          </a:p>
-          <a:p>
-            <a:pPr>
-              <a:lnSpc>
-                <a:spcPct val="90000"/>
-              </a:lnSpc>
-            </a:pPr>
-            <a:r>
-              <a:rPr lang="en-US" sz="1700"/>
-              <a:t>Built-in /auth route handler for JWT token test (can override)</a:t>
-            </a:r>
-          </a:p>
-          <a:p>
-            <a:pPr>
-              <a:lnSpc>
-                <a:spcPct val="90000"/>
-              </a:lnSpc>
-            </a:pPr>
-            <a:r>
-              <a:rPr lang="en-US" sz="1700"/>
-              <a:t>Route debug printing (adding, handling routes)</a:t>
-            </a:r>
-          </a:p>
-          <a:p>
-            <a:pPr>
-              <a:lnSpc>
-                <a:spcPct val="90000"/>
-              </a:lnSpc>
-            </a:pPr>
-            <a:endParaRPr lang="en-US" sz="1700"/>
-          </a:p>
-          <a:p>
             <a:pPr marL="0" indent="0">
-              <a:lnSpc>
-                <a:spcPct val="90000"/>
-              </a:lnSpc>
               <a:buNone/>
             </a:pPr>
             <a:r>
-              <a:rPr lang="en-US" sz="1700">
-                <a:latin typeface="Consolas" panose="020B0609020204030204" pitchFamily="49" charset="0"/>
-                <a:cs typeface="Consolas" panose="020B0609020204030204" pitchFamily="49" charset="0"/>
-              </a:rPr>
-              <a:t>router.addRoute("GET", "/info", [](Request &amp;req, Response &amp;res) { res.sendText("System Info Page"); });</a:t>
+              <a:rPr lang="en-US" dirty="0"/>
+              <a:t>class </a:t>
+            </a:r>
+            <a:r>
+              <a:rPr lang="en-US" dirty="0" err="1"/>
+              <a:t>MyApp</a:t>
+            </a:r>
+            <a:r>
+              <a:rPr lang="en-US" dirty="0"/>
+              <a:t> : public FrameworkApp {</a:t>
             </a:r>
           </a:p>
           <a:p>
             <a:pPr marL="0" indent="0">
-              <a:lnSpc>
-                <a:spcPct val="90000"/>
-              </a:lnSpc>
               <a:buNone/>
             </a:pPr>
-            <a:endParaRPr lang="en-US" sz="1700">
-              <a:latin typeface="Consolas" panose="020B0609020204030204" pitchFamily="49" charset="0"/>
-              <a:cs typeface="Consolas" panose="020B0609020204030204" pitchFamily="49" charset="0"/>
-            </a:endParaRPr>
+            <a:r>
+              <a:rPr lang="en-US" dirty="0"/>
+              <a:t>public:</a:t>
+            </a:r>
           </a:p>
           <a:p>
             <a:pPr marL="0" indent="0">
-              <a:lnSpc>
-                <a:spcPct val="90000"/>
-              </a:lnSpc>
               <a:buNone/>
             </a:pPr>
             <a:r>
-              <a:rPr lang="en-US" sz="1700">
-                <a:latin typeface="Consolas" panose="020B0609020204030204" pitchFamily="49" charset="0"/>
-                <a:cs typeface="Consolas" panose="020B0609020204030204" pitchFamily="49" charset="0"/>
-              </a:rPr>
-              <a:t>router.addRoute("POST", "/config", configHandler, {authMiddleware});</a:t>
+              <a:rPr lang="en-US" dirty="0"/>
+              <a:t>    </a:t>
+            </a:r>
+            <a:r>
+              <a:rPr lang="en-US" dirty="0" err="1"/>
+              <a:t>MyApp</a:t>
+            </a:r>
+            <a:r>
+              <a:rPr lang="en-US" dirty="0"/>
+              <a:t>() : FrameworkApp(80, "</a:t>
+            </a:r>
+            <a:r>
+              <a:rPr lang="en-US" dirty="0" err="1"/>
+              <a:t>MyApp</a:t>
+            </a:r>
+            <a:r>
+              <a:rPr lang="en-US" dirty="0"/>
+              <a:t>") {}</a:t>
             </a:r>
           </a:p>
           <a:p>
-            <a:pPr>
-              <a:lnSpc>
-                <a:spcPct val="90000"/>
-              </a:lnSpc>
+            <a:pPr marL="0" indent="0">
+              <a:buNone/>
             </a:pPr>
-            <a:endParaRPr lang="en-US" sz="1700"/>
+            <a:endParaRPr lang="en-US" dirty="0"/>
+          </a:p>
+          <a:p>
+            <a:pPr marL="0" indent="0">
+              <a:buNone/>
+            </a:pPr>
+            <a:r>
+              <a:rPr lang="en-US" dirty="0"/>
+              <a:t>    void </a:t>
+            </a:r>
+            <a:r>
+              <a:rPr lang="en-US" dirty="0" err="1"/>
+              <a:t>onStart</a:t>
+            </a:r>
+            <a:r>
+              <a:rPr lang="en-US" dirty="0"/>
+              <a:t>() override {</a:t>
+            </a:r>
+          </a:p>
+          <a:p>
+            <a:pPr marL="0" indent="0">
+              <a:buNone/>
+            </a:pPr>
+            <a:r>
+              <a:rPr lang="en-US" dirty="0"/>
+              <a:t>        TRACE("App starting up...");</a:t>
+            </a:r>
+          </a:p>
+          <a:p>
+            <a:pPr marL="0" indent="0">
+              <a:buNone/>
+            </a:pPr>
+            <a:r>
+              <a:rPr lang="en-US" dirty="0"/>
+              <a:t>        // Initialize sensors, state, etc.</a:t>
+            </a:r>
+          </a:p>
+          <a:p>
+            <a:pPr marL="0" indent="0">
+              <a:buNone/>
+            </a:pPr>
+            <a:r>
+              <a:rPr lang="en-US" dirty="0"/>
+              <a:t>    }</a:t>
+            </a:r>
+          </a:p>
+          <a:p>
+            <a:pPr marL="0" indent="0">
+              <a:buNone/>
+            </a:pPr>
+            <a:endParaRPr lang="en-US" dirty="0"/>
+          </a:p>
+          <a:p>
+            <a:pPr marL="0" indent="0">
+              <a:buNone/>
+            </a:pPr>
+            <a:r>
+              <a:rPr lang="en-US" dirty="0"/>
+              <a:t>    void poll() override {</a:t>
+            </a:r>
+          </a:p>
+          <a:p>
+            <a:pPr marL="0" indent="0">
+              <a:buNone/>
+            </a:pPr>
+            <a:r>
+              <a:rPr lang="en-US" dirty="0"/>
+              <a:t>        // Main loop logic here</a:t>
+            </a:r>
+          </a:p>
+          <a:p>
+            <a:pPr marL="0" indent="0">
+              <a:buNone/>
+            </a:pPr>
+            <a:r>
+              <a:rPr lang="en-US" dirty="0"/>
+              <a:t>    }</a:t>
+            </a:r>
+          </a:p>
+          <a:p>
+            <a:pPr marL="0" indent="0">
+              <a:buNone/>
+            </a:pPr>
+            <a:endParaRPr lang="en-US" dirty="0"/>
+          </a:p>
+          <a:p>
+            <a:pPr marL="0" indent="0">
+              <a:buNone/>
+            </a:pPr>
+            <a:r>
+              <a:rPr lang="en-US" dirty="0"/>
+              <a:t>    void onEvent(const Event&amp; e) override {</a:t>
+            </a:r>
+          </a:p>
+          <a:p>
+            <a:pPr marL="0" indent="0">
+              <a:buNone/>
+            </a:pPr>
+            <a:r>
+              <a:rPr lang="en-US" dirty="0"/>
+              <a:t>        // Handle events here</a:t>
+            </a:r>
+          </a:p>
+          <a:p>
+            <a:pPr marL="0" indent="0">
+              <a:buNone/>
+            </a:pPr>
+            <a:r>
+              <a:rPr lang="en-US" dirty="0"/>
+              <a:t>    }</a:t>
+            </a:r>
+          </a:p>
+          <a:p>
+            <a:pPr marL="0" indent="0">
+              <a:buNone/>
+            </a:pPr>
+            <a:r>
+              <a:rPr lang="en-US" dirty="0"/>
+              <a:t>};</a:t>
+            </a:r>
           </a:p>
         </p:txBody>
       </p:sp>
     </p:spTree>
     <p:extLst>
       <p:ext uri="{BB962C8B-B14F-4D97-AF65-F5344CB8AC3E}">
-        <p14:creationId xmlns:p14="http://schemas.microsoft.com/office/powerpoint/2010/main" val="4051212457"/>
+        <p14:creationId xmlns:p14="http://schemas.microsoft.com/office/powerpoint/2010/main" val="866328872"/>
       </p:ext>
     </p:extLst>
   </p:cSld>

</xml_diff>

<commit_message>
Use sntp for setting rtc
</commit_message>
<xml_diff>
--- a/docs/picoframework_full_presentation_combined.pptx
+++ b/docs/picoframework_full_presentation_combined.pptx
@@ -45341,7 +45341,7 @@
             </a:pPr>
             <a:r>
               <a:rPr lang="en-US" sz="1700" dirty="0"/>
-              <a:t>Microcontrollers’ limited flash and RAM has historically made it hard to replicate smaller devices </a:t>
+              <a:t>Limited flash and RAM has historically made it hard to replicate these frameworks on microcontrollers</a:t>
             </a:r>
           </a:p>
           <a:p>
@@ -45355,7 +45355,7 @@
             </a:pPr>
             <a:r>
               <a:rPr lang="en-US" sz="1700" dirty="0"/>
-              <a:t>The Pico and particularly the Pico 2 have no major limitations on flash and available RAM is enough to support an application framework</a:t>
+              <a:t>The Pico and particularly the Pico 2 have a significant amount of flash, and the available RAM is enough to support an application framework</a:t>
             </a:r>
           </a:p>
           <a:p>
@@ -45369,7 +45369,7 @@
             </a:pPr>
             <a:r>
               <a:rPr lang="en-US" sz="1700" dirty="0"/>
-              <a:t>Although the Pico SDK is extensive it does not have the mature higher- level components such as out-of-the box HTTP handling in the manner of the ESP32, and it has a strong bare-metal focus</a:t>
+              <a:t>Although the Pico SDK is extensive it does not have FreeRTOS underpinning it, it also lacks components such as out-of-the box HTTP handling in the manner of the ESP3. It has a strong bare-metal focus</a:t>
             </a:r>
           </a:p>
           <a:p>

</xml_diff>